<commit_message>
added pandas description slide
</commit_message>
<xml_diff>
--- a/Pandas_Training_Slides.pptx
+++ b/Pandas_Training_Slides.pptx
@@ -5,7 +5,7 @@
     <p:sldMasterId id="2147483648" r:id="rId1"/>
   </p:sldMasterIdLst>
   <p:notesMasterIdLst>
-    <p:notesMasterId r:id="rId9"/>
+    <p:notesMasterId r:id="rId11"/>
   </p:notesMasterIdLst>
   <p:sldIdLst>
     <p:sldId id="263" r:id="rId2"/>
@@ -13,8 +13,10 @@
     <p:sldId id="257" r:id="rId4"/>
     <p:sldId id="260" r:id="rId5"/>
     <p:sldId id="262" r:id="rId6"/>
-    <p:sldId id="258" r:id="rId7"/>
-    <p:sldId id="259" r:id="rId8"/>
+    <p:sldId id="264" r:id="rId7"/>
+    <p:sldId id="258" r:id="rId8"/>
+    <p:sldId id="259" r:id="rId9"/>
+    <p:sldId id="265" r:id="rId10"/>
   </p:sldIdLst>
   <p:sldSz cx="12192000" cy="6858000"/>
   <p:notesSz cx="6858000" cy="9144000"/>
@@ -202,7 +204,7 @@
           </a:lstStyle>
           <a:p>
             <a:fld id="{E57A08F2-BB89-A243-B58E-EF977EF4C386}" type="datetimeFigureOut">
-              <a:t>08/01/2021</a:t>
+              <a:t>11/01/2021</a:t>
             </a:fld>
             <a:endParaRPr lang="en-NL"/>
           </a:p>
@@ -515,7 +517,7 @@
           <a:p>
             <a:r>
               <a:rPr lang="en-NL"/>
-              <a:t>but also easy way to access api’s etc.</a:t>
+              <a:t>but also easy way to access api’s, scheduling using Airflow, webscraping with beautifulsoup, scrapy etc.</a:t>
             </a:r>
           </a:p>
         </p:txBody>
@@ -687,7 +689,7 @@
           <a:p>
             <a:r>
               <a:rPr lang="en-NL"/>
-              <a:t>pandas series are just one column of your data, they are 1 dimensional</a:t>
+              <a:t>jupyter notebook for commenting and interactive data analysis, IDE is handier for writing production code, although Microsoft also makes it a lot easier to use Visual Studio as a notebook environment</a:t>
             </a:r>
           </a:p>
         </p:txBody>
@@ -708,7 +710,8 @@
           <a:lstStyle/>
           <a:p>
             <a:fld id="{182B101C-A8DC-374B-816A-E743FC59D6B0}" type="slidenum">
-              <a:t>6</a:t>
+              <a:rPr lang="en-NL"/>
+              <a:t>4</a:t>
             </a:fld>
             <a:endParaRPr lang="en-NL"/>
           </a:p>
@@ -717,7 +720,7 @@
     </p:spTree>
     <p:extLst>
       <p:ext uri="{BB962C8B-B14F-4D97-AF65-F5344CB8AC3E}">
-        <p14:creationId xmlns:p14="http://schemas.microsoft.com/office/powerpoint/2010/main" val="2094711334"/>
+        <p14:creationId xmlns:p14="http://schemas.microsoft.com/office/powerpoint/2010/main" val="2866973064"/>
       </p:ext>
     </p:extLst>
   </p:cSld>
@@ -773,8 +776,110 @@
           <a:p>
             <a:r>
               <a:rPr lang="en-NL"/>
+              <a:t>pandas mostly excels in data wrangling and analysis. Visualization could also be done in PowerBI or Tableau. I use SQL to get data and pandas to wrangle.</a:t>
+            </a:r>
+          </a:p>
+        </p:txBody>
+      </p:sp>
+      <p:sp>
+        <p:nvSpPr>
+          <p:cNvPr id="4" name="Slide Number Placeholder 3"/>
+          <p:cNvSpPr>
+            <a:spLocks noGrp="1"/>
+          </p:cNvSpPr>
+          <p:nvPr>
+            <p:ph type="sldNum" sz="quarter" idx="5"/>
+          </p:nvPr>
+        </p:nvSpPr>
+        <p:spPr/>
+        <p:txBody>
+          <a:bodyPr/>
+          <a:lstStyle/>
+          <a:p>
+            <a:fld id="{182B101C-A8DC-374B-816A-E743FC59D6B0}" type="slidenum">
+              <a:rPr lang="en-NL"/>
+              <a:t>6</a:t>
+            </a:fld>
+            <a:endParaRPr lang="en-NL"/>
+          </a:p>
+        </p:txBody>
+      </p:sp>
+    </p:spTree>
+    <p:extLst>
+      <p:ext uri="{BB962C8B-B14F-4D97-AF65-F5344CB8AC3E}">
+        <p14:creationId xmlns:p14="http://schemas.microsoft.com/office/powerpoint/2010/main" val="2237721319"/>
+      </p:ext>
+    </p:extLst>
+  </p:cSld>
+  <p:clrMapOvr>
+    <a:masterClrMapping/>
+  </p:clrMapOvr>
+</p:notes>
+</file>
+
+<file path=ppt/notesSlides/notesSlide5.xml><?xml version="1.0" encoding="utf-8"?>
+<p:notes xmlns:a="http://schemas.openxmlformats.org/drawingml/2006/main" xmlns:r="http://schemas.openxmlformats.org/officeDocument/2006/relationships" xmlns:p="http://schemas.openxmlformats.org/presentationml/2006/main">
+  <p:cSld>
+    <p:spTree>
+      <p:nvGrpSpPr>
+        <p:cNvPr id="1" name=""/>
+        <p:cNvGrpSpPr/>
+        <p:nvPr/>
+      </p:nvGrpSpPr>
+      <p:grpSpPr>
+        <a:xfrm>
+          <a:off x="0" y="0"/>
+          <a:ext cx="0" cy="0"/>
+          <a:chOff x="0" y="0"/>
+          <a:chExt cx="0" cy="0"/>
+        </a:xfrm>
+      </p:grpSpPr>
+      <p:sp>
+        <p:nvSpPr>
+          <p:cNvPr id="2" name="Slide Image Placeholder 1"/>
+          <p:cNvSpPr>
+            <a:spLocks noGrp="1" noRot="1" noChangeAspect="1"/>
+          </p:cNvSpPr>
+          <p:nvPr>
+            <p:ph type="sldImg"/>
+          </p:nvPr>
+        </p:nvSpPr>
+        <p:spPr/>
+      </p:sp>
+      <p:sp>
+        <p:nvSpPr>
+          <p:cNvPr id="3" name="Notes Placeholder 2"/>
+          <p:cNvSpPr>
+            <a:spLocks noGrp="1"/>
+          </p:cNvSpPr>
+          <p:nvPr>
+            <p:ph type="body" idx="1"/>
+          </p:nvPr>
+        </p:nvSpPr>
+        <p:spPr/>
+        <p:txBody>
+          <a:bodyPr/>
+          <a:lstStyle/>
+          <a:p>
+            <a:r>
+              <a:rPr lang="en-NL"/>
               <a:t>pandas series are just one column of your data, they are 1 dimensional</a:t>
             </a:r>
+          </a:p>
+          <a:p>
+            <a:endParaRPr lang="en-NL"/>
+          </a:p>
+          <a:p>
+            <a:r>
+              <a:rPr lang="en-NL"/>
+              <a:t>columns can contain mixed datatypes</a:t>
+            </a:r>
+          </a:p>
+          <a:p>
+            <a:endParaRPr lang="en-NL"/>
+          </a:p>
+          <a:p>
+            <a:endParaRPr lang="en-NL"/>
           </a:p>
         </p:txBody>
       </p:sp>
@@ -795,6 +900,92 @@
           <a:p>
             <a:fld id="{182B101C-A8DC-374B-816A-E743FC59D6B0}" type="slidenum">
               <a:t>7</a:t>
+            </a:fld>
+            <a:endParaRPr lang="en-NL"/>
+          </a:p>
+        </p:txBody>
+      </p:sp>
+    </p:spTree>
+    <p:extLst>
+      <p:ext uri="{BB962C8B-B14F-4D97-AF65-F5344CB8AC3E}">
+        <p14:creationId xmlns:p14="http://schemas.microsoft.com/office/powerpoint/2010/main" val="2094711334"/>
+      </p:ext>
+    </p:extLst>
+  </p:cSld>
+  <p:clrMapOvr>
+    <a:masterClrMapping/>
+  </p:clrMapOvr>
+</p:notes>
+</file>
+
+<file path=ppt/notesSlides/notesSlide6.xml><?xml version="1.0" encoding="utf-8"?>
+<p:notes xmlns:a="http://schemas.openxmlformats.org/drawingml/2006/main" xmlns:r="http://schemas.openxmlformats.org/officeDocument/2006/relationships" xmlns:p="http://schemas.openxmlformats.org/presentationml/2006/main">
+  <p:cSld>
+    <p:spTree>
+      <p:nvGrpSpPr>
+        <p:cNvPr id="1" name=""/>
+        <p:cNvGrpSpPr/>
+        <p:nvPr/>
+      </p:nvGrpSpPr>
+      <p:grpSpPr>
+        <a:xfrm>
+          <a:off x="0" y="0"/>
+          <a:ext cx="0" cy="0"/>
+          <a:chOff x="0" y="0"/>
+          <a:chExt cx="0" cy="0"/>
+        </a:xfrm>
+      </p:grpSpPr>
+      <p:sp>
+        <p:nvSpPr>
+          <p:cNvPr id="2" name="Slide Image Placeholder 1"/>
+          <p:cNvSpPr>
+            <a:spLocks noGrp="1" noRot="1" noChangeAspect="1"/>
+          </p:cNvSpPr>
+          <p:nvPr>
+            <p:ph type="sldImg"/>
+          </p:nvPr>
+        </p:nvSpPr>
+        <p:spPr/>
+      </p:sp>
+      <p:sp>
+        <p:nvSpPr>
+          <p:cNvPr id="3" name="Notes Placeholder 2"/>
+          <p:cNvSpPr>
+            <a:spLocks noGrp="1"/>
+          </p:cNvSpPr>
+          <p:nvPr>
+            <p:ph type="body" idx="1"/>
+          </p:nvPr>
+        </p:nvSpPr>
+        <p:spPr/>
+        <p:txBody>
+          <a:bodyPr/>
+          <a:lstStyle/>
+          <a:p>
+            <a:r>
+              <a:rPr lang="en-NL"/>
+              <a:t>pandas series are just one column of your data, they are 1 dimensional</a:t>
+            </a:r>
+          </a:p>
+        </p:txBody>
+      </p:sp>
+      <p:sp>
+        <p:nvSpPr>
+          <p:cNvPr id="4" name="Slide Number Placeholder 3"/>
+          <p:cNvSpPr>
+            <a:spLocks noGrp="1"/>
+          </p:cNvSpPr>
+          <p:nvPr>
+            <p:ph type="sldNum" sz="quarter" idx="5"/>
+          </p:nvPr>
+        </p:nvSpPr>
+        <p:spPr/>
+        <p:txBody>
+          <a:bodyPr/>
+          <a:lstStyle/>
+          <a:p>
+            <a:fld id="{182B101C-A8DC-374B-816A-E743FC59D6B0}" type="slidenum">
+              <a:t>8</a:t>
             </a:fld>
             <a:endParaRPr lang="en-NL"/>
           </a:p>
@@ -961,7 +1152,7 @@
           <a:lstStyle/>
           <a:p>
             <a:fld id="{595B5CFB-66E7-284C-9A5B-718B2335AB36}" type="datetimeFigureOut">
-              <a:t>08/01/2021</a:t>
+              <a:t>11/01/2021</a:t>
             </a:fld>
             <a:endParaRPr lang="en-NL"/>
           </a:p>
@@ -1159,7 +1350,7 @@
           <a:lstStyle/>
           <a:p>
             <a:fld id="{595B5CFB-66E7-284C-9A5B-718B2335AB36}" type="datetimeFigureOut">
-              <a:t>08/01/2021</a:t>
+              <a:t>11/01/2021</a:t>
             </a:fld>
             <a:endParaRPr lang="en-NL"/>
           </a:p>
@@ -1367,7 +1558,7 @@
           <a:lstStyle/>
           <a:p>
             <a:fld id="{595B5CFB-66E7-284C-9A5B-718B2335AB36}" type="datetimeFigureOut">
-              <a:t>08/01/2021</a:t>
+              <a:t>11/01/2021</a:t>
             </a:fld>
             <a:endParaRPr lang="en-NL"/>
           </a:p>
@@ -1565,7 +1756,7 @@
           <a:lstStyle/>
           <a:p>
             <a:fld id="{595B5CFB-66E7-284C-9A5B-718B2335AB36}" type="datetimeFigureOut">
-              <a:t>08/01/2021</a:t>
+              <a:t>11/01/2021</a:t>
             </a:fld>
             <a:endParaRPr lang="en-NL"/>
           </a:p>
@@ -1839,7 +2030,7 @@
           <a:lstStyle/>
           <a:p>
             <a:fld id="{595B5CFB-66E7-284C-9A5B-718B2335AB36}" type="datetimeFigureOut">
-              <a:t>08/01/2021</a:t>
+              <a:t>11/01/2021</a:t>
             </a:fld>
             <a:endParaRPr lang="en-NL"/>
           </a:p>
@@ -2105,7 +2296,7 @@
           <a:lstStyle/>
           <a:p>
             <a:fld id="{595B5CFB-66E7-284C-9A5B-718B2335AB36}" type="datetimeFigureOut">
-              <a:t>08/01/2021</a:t>
+              <a:t>11/01/2021</a:t>
             </a:fld>
             <a:endParaRPr lang="en-NL"/>
           </a:p>
@@ -2518,7 +2709,7 @@
           <a:lstStyle/>
           <a:p>
             <a:fld id="{595B5CFB-66E7-284C-9A5B-718B2335AB36}" type="datetimeFigureOut">
-              <a:t>08/01/2021</a:t>
+              <a:t>11/01/2021</a:t>
             </a:fld>
             <a:endParaRPr lang="en-NL"/>
           </a:p>
@@ -2658,7 +2849,7 @@
           <a:lstStyle/>
           <a:p>
             <a:fld id="{595B5CFB-66E7-284C-9A5B-718B2335AB36}" type="datetimeFigureOut">
-              <a:t>08/01/2021</a:t>
+              <a:t>11/01/2021</a:t>
             </a:fld>
             <a:endParaRPr lang="en-NL"/>
           </a:p>
@@ -2769,7 +2960,7 @@
           <a:lstStyle/>
           <a:p>
             <a:fld id="{595B5CFB-66E7-284C-9A5B-718B2335AB36}" type="datetimeFigureOut">
-              <a:t>08/01/2021</a:t>
+              <a:t>11/01/2021</a:t>
             </a:fld>
             <a:endParaRPr lang="en-NL"/>
           </a:p>
@@ -3080,7 +3271,7 @@
           <a:lstStyle/>
           <a:p>
             <a:fld id="{595B5CFB-66E7-284C-9A5B-718B2335AB36}" type="datetimeFigureOut">
-              <a:t>08/01/2021</a:t>
+              <a:t>11/01/2021</a:t>
             </a:fld>
             <a:endParaRPr lang="en-NL"/>
           </a:p>
@@ -3367,7 +3558,7 @@
           <a:lstStyle/>
           <a:p>
             <a:fld id="{595B5CFB-66E7-284C-9A5B-718B2335AB36}" type="datetimeFigureOut">
-              <a:t>08/01/2021</a:t>
+              <a:t>11/01/2021</a:t>
             </a:fld>
             <a:endParaRPr lang="en-NL"/>
           </a:p>
@@ -3608,7 +3799,7 @@
           </a:lstStyle>
           <a:p>
             <a:fld id="{595B5CFB-66E7-284C-9A5B-718B2335AB36}" type="datetimeFigureOut">
-              <a:t>08/01/2021</a:t>
+              <a:t>11/01/2021</a:t>
             </a:fld>
             <a:endParaRPr lang="en-NL"/>
           </a:p>
@@ -4172,7 +4363,7 @@
           <a:p>
             <a:r>
               <a:rPr lang="en-NL" sz="2600"/>
-              <a:t>Data inspectie 			---&gt; pd.info()   pd.head()    pd.describe()</a:t>
+              <a:t>Data inspectie 			---&gt; df.info()   df.head()    df.describe()</a:t>
             </a:r>
           </a:p>
           <a:p>
@@ -4499,8 +4690,8 @@
         </p:nvSpPr>
         <p:spPr>
           <a:xfrm>
-            <a:off x="4823254" y="1104610"/>
-            <a:ext cx="2545492" cy="568411"/>
+            <a:off x="5123542" y="1083782"/>
+            <a:ext cx="1944915" cy="568411"/>
           </a:xfrm>
           <a:prstGeom prst="rect">
             <a:avLst/>
@@ -4527,7 +4718,7 @@
             <a:pPr algn="ctr"/>
             <a:r>
               <a:rPr lang="en-NL"/>
-              <a:t>Data Science</a:t>
+              <a:t>Data Science / Data Engineering</a:t>
             </a:r>
           </a:p>
         </p:txBody>
@@ -4546,8 +4737,8 @@
         </p:nvSpPr>
         <p:spPr>
           <a:xfrm>
-            <a:off x="8403321" y="1100691"/>
-            <a:ext cx="2545492" cy="568411"/>
+            <a:off x="8611932" y="1100691"/>
+            <a:ext cx="2207643" cy="568411"/>
           </a:xfrm>
           <a:prstGeom prst="rect">
             <a:avLst/>
@@ -5118,7 +5309,7 @@
           <p:nvPr/>
         </p:nvPicPr>
         <p:blipFill rotWithShape="1">
-          <a:blip r:embed="rId2"/>
+          <a:blip r:embed="rId3"/>
           <a:srcRect r="9841" b="-3"/>
           <a:stretch/>
         </p:blipFill>
@@ -5147,7 +5338,7 @@
           <p:nvPr/>
         </p:nvPicPr>
         <p:blipFill rotWithShape="1">
-          <a:blip r:embed="rId3"/>
+          <a:blip r:embed="rId4"/>
           <a:srcRect t="4013" r="-2" b="-2"/>
           <a:stretch/>
         </p:blipFill>
@@ -5543,6 +5734,156 @@
       </p:grpSpPr>
       <p:sp>
         <p:nvSpPr>
+          <p:cNvPr id="2" name="Title 1">
+            <a:extLst>
+              <a:ext uri="{FF2B5EF4-FFF2-40B4-BE49-F238E27FC236}">
+                <a16:creationId xmlns:a16="http://schemas.microsoft.com/office/drawing/2014/main" id="{FC3C466B-06F5-B84D-A8D3-0B638E77F456}"/>
+              </a:ext>
+            </a:extLst>
+          </p:cNvPr>
+          <p:cNvSpPr>
+            <a:spLocks noGrp="1"/>
+          </p:cNvSpPr>
+          <p:nvPr>
+            <p:ph type="title"/>
+          </p:nvPr>
+        </p:nvSpPr>
+        <p:spPr>
+          <a:xfrm>
+            <a:off x="0" y="1"/>
+            <a:ext cx="12192000" cy="1690688"/>
+          </a:xfrm>
+          <a:solidFill>
+            <a:schemeClr val="bg1"/>
+          </a:solidFill>
+        </p:spPr>
+        <p:txBody>
+          <a:bodyPr/>
+          <a:lstStyle/>
+          <a:p>
+            <a:r>
+              <a:rPr lang="en-NL"/>
+              <a:t>Wat is pandas?</a:t>
+            </a:r>
+          </a:p>
+        </p:txBody>
+      </p:sp>
+      <p:pic>
+        <p:nvPicPr>
+          <p:cNvPr id="5" name="Content Placeholder 4" descr="Text&#10;&#10;Description automatically generated">
+            <a:extLst>
+              <a:ext uri="{FF2B5EF4-FFF2-40B4-BE49-F238E27FC236}">
+                <a16:creationId xmlns:a16="http://schemas.microsoft.com/office/drawing/2014/main" id="{9F5F247A-2656-594C-A237-894E5FEE8718}"/>
+              </a:ext>
+            </a:extLst>
+          </p:cNvPr>
+          <p:cNvPicPr>
+            <a:picLocks noGrp="1" noChangeAspect="1"/>
+          </p:cNvPicPr>
+          <p:nvPr>
+            <p:ph idx="1"/>
+          </p:nvPr>
+        </p:nvPicPr>
+        <p:blipFill>
+          <a:blip r:embed="rId3"/>
+          <a:stretch>
+            <a:fillRect/>
+          </a:stretch>
+        </p:blipFill>
+        <p:spPr>
+          <a:xfrm>
+            <a:off x="143164" y="4066543"/>
+            <a:ext cx="11905671" cy="2089825"/>
+          </a:xfrm>
+        </p:spPr>
+      </p:pic>
+      <p:pic>
+        <p:nvPicPr>
+          <p:cNvPr id="1026" name="Picture 2" descr="pandas (software) - Wikipedia">
+            <a:extLst>
+              <a:ext uri="{FF2B5EF4-FFF2-40B4-BE49-F238E27FC236}">
+                <a16:creationId xmlns:a16="http://schemas.microsoft.com/office/drawing/2014/main" id="{A0C9A81B-8796-4048-8EF3-6CE8AA3CF185}"/>
+              </a:ext>
+            </a:extLst>
+          </p:cNvPr>
+          <p:cNvPicPr>
+            <a:picLocks noChangeAspect="1" noChangeArrowheads="1"/>
+          </p:cNvPicPr>
+          <p:nvPr/>
+        </p:nvPicPr>
+        <p:blipFill>
+          <a:blip r:embed="rId4">
+            <a:extLst>
+              <a:ext uri="{28A0092B-C50C-407E-A947-70E740481C1C}">
+                <a14:useLocalDpi xmlns:a14="http://schemas.microsoft.com/office/drawing/2010/main" val="0"/>
+              </a:ext>
+            </a:extLst>
+          </a:blip>
+          <a:srcRect/>
+          <a:stretch>
+            <a:fillRect/>
+          </a:stretch>
+        </p:blipFill>
+        <p:spPr bwMode="auto">
+          <a:xfrm>
+            <a:off x="0" y="1615986"/>
+            <a:ext cx="6096000" cy="2463800"/>
+          </a:xfrm>
+          <a:prstGeom prst="rect">
+            <a:avLst/>
+          </a:prstGeom>
+          <a:noFill/>
+          <a:extLst>
+            <a:ext uri="{909E8E84-426E-40DD-AFC4-6F175D3DCCD1}">
+              <a14:hiddenFill xmlns:a14="http://schemas.microsoft.com/office/drawing/2010/main">
+                <a:solidFill>
+                  <a:srgbClr val="FFFFFF"/>
+                </a:solidFill>
+              </a14:hiddenFill>
+            </a:ext>
+          </a:extLst>
+        </p:spPr>
+      </p:pic>
+    </p:spTree>
+    <p:extLst>
+      <p:ext uri="{BB962C8B-B14F-4D97-AF65-F5344CB8AC3E}">
+        <p14:creationId xmlns:p14="http://schemas.microsoft.com/office/powerpoint/2010/main" val="1499705360"/>
+      </p:ext>
+    </p:extLst>
+  </p:cSld>
+  <p:clrMapOvr>
+    <a:masterClrMapping/>
+  </p:clrMapOvr>
+</p:sld>
+</file>
+
+<file path=ppt/slides/slide7.xml><?xml version="1.0" encoding="utf-8"?>
+<p:sld xmlns:a="http://schemas.openxmlformats.org/drawingml/2006/main" xmlns:r="http://schemas.openxmlformats.org/officeDocument/2006/relationships" xmlns:p="http://schemas.openxmlformats.org/presentationml/2006/main">
+  <p:cSld>
+    <p:bg>
+      <p:bgPr>
+        <a:solidFill>
+          <a:schemeClr val="bg2"/>
+        </a:solidFill>
+        <a:effectLst/>
+      </p:bgPr>
+    </p:bg>
+    <p:spTree>
+      <p:nvGrpSpPr>
+        <p:cNvPr id="1" name=""/>
+        <p:cNvGrpSpPr/>
+        <p:nvPr/>
+      </p:nvGrpSpPr>
+      <p:grpSpPr>
+        <a:xfrm>
+          <a:off x="0" y="0"/>
+          <a:ext cx="0" cy="0"/>
+          <a:chOff x="0" y="0"/>
+          <a:chExt cx="0" cy="0"/>
+        </a:xfrm>
+      </p:grpSpPr>
+      <p:sp>
+        <p:nvSpPr>
           <p:cNvPr id="10" name="Rectangle 9">
             <a:extLst>
               <a:ext uri="{FF2B5EF4-FFF2-40B4-BE49-F238E27FC236}">
@@ -5636,7 +5977,7 @@
           <a:p>
             <a:r>
               <a:rPr lang="en-US"/>
-              <a:t>Most important concept is the DataFrame</a:t>
+              <a:t>Most important concept is a DataFrame</a:t>
             </a:r>
           </a:p>
         </p:txBody>
@@ -5760,7 +6101,7 @@
 </p:sld>
 </file>
 
-<file path=ppt/slides/slide7.xml><?xml version="1.0" encoding="utf-8"?>
+<file path=ppt/slides/slide8.xml><?xml version="1.0" encoding="utf-8"?>
 <p:sld xmlns:a="http://schemas.openxmlformats.org/drawingml/2006/main" xmlns:r="http://schemas.openxmlformats.org/officeDocument/2006/relationships" xmlns:p="http://schemas.openxmlformats.org/presentationml/2006/main">
   <p:cSld>
     <p:bg>
@@ -5992,6 +6333,86 @@
     <p:extLst>
       <p:ext uri="{BB962C8B-B14F-4D97-AF65-F5344CB8AC3E}">
         <p14:creationId xmlns:p14="http://schemas.microsoft.com/office/powerpoint/2010/main" val="2530735211"/>
+      </p:ext>
+    </p:extLst>
+  </p:cSld>
+  <p:clrMapOvr>
+    <a:masterClrMapping/>
+  </p:clrMapOvr>
+</p:sld>
+</file>
+
+<file path=ppt/slides/slide9.xml><?xml version="1.0" encoding="utf-8"?>
+<p:sld xmlns:a="http://schemas.openxmlformats.org/drawingml/2006/main" xmlns:r="http://schemas.openxmlformats.org/officeDocument/2006/relationships" xmlns:p="http://schemas.openxmlformats.org/presentationml/2006/main">
+  <p:cSld>
+    <p:spTree>
+      <p:nvGrpSpPr>
+        <p:cNvPr id="1" name=""/>
+        <p:cNvGrpSpPr/>
+        <p:nvPr/>
+      </p:nvGrpSpPr>
+      <p:grpSpPr>
+        <a:xfrm>
+          <a:off x="0" y="0"/>
+          <a:ext cx="0" cy="0"/>
+          <a:chOff x="0" y="0"/>
+          <a:chExt cx="0" cy="0"/>
+        </a:xfrm>
+      </p:grpSpPr>
+      <p:sp>
+        <p:nvSpPr>
+          <p:cNvPr id="2" name="Title 1">
+            <a:extLst>
+              <a:ext uri="{FF2B5EF4-FFF2-40B4-BE49-F238E27FC236}">
+                <a16:creationId xmlns:a16="http://schemas.microsoft.com/office/drawing/2014/main" id="{C8163A18-D894-FF42-A3CF-D81F0CB8B8FF}"/>
+              </a:ext>
+            </a:extLst>
+          </p:cNvPr>
+          <p:cNvSpPr>
+            <a:spLocks noGrp="1"/>
+          </p:cNvSpPr>
+          <p:nvPr>
+            <p:ph type="title"/>
+          </p:nvPr>
+        </p:nvSpPr>
+        <p:spPr/>
+        <p:txBody>
+          <a:bodyPr/>
+          <a:lstStyle/>
+          <a:p>
+            <a:endParaRPr lang="en-NL"/>
+          </a:p>
+        </p:txBody>
+      </p:sp>
+      <p:sp>
+        <p:nvSpPr>
+          <p:cNvPr id="3" name="Content Placeholder 2">
+            <a:extLst>
+              <a:ext uri="{FF2B5EF4-FFF2-40B4-BE49-F238E27FC236}">
+                <a16:creationId xmlns:a16="http://schemas.microsoft.com/office/drawing/2014/main" id="{A862A42A-6411-234E-B760-651D87AF8D16}"/>
+              </a:ext>
+            </a:extLst>
+          </p:cNvPr>
+          <p:cNvSpPr>
+            <a:spLocks noGrp="1"/>
+          </p:cNvSpPr>
+          <p:nvPr>
+            <p:ph idx="1"/>
+          </p:nvPr>
+        </p:nvSpPr>
+        <p:spPr/>
+        <p:txBody>
+          <a:bodyPr/>
+          <a:lstStyle/>
+          <a:p>
+            <a:endParaRPr lang="en-NL"/>
+          </a:p>
+        </p:txBody>
+      </p:sp>
+    </p:spTree>
+    <p:extLst>
+      <p:ext uri="{BB962C8B-B14F-4D97-AF65-F5344CB8AC3E}">
+        <p14:creationId xmlns:p14="http://schemas.microsoft.com/office/powerpoint/2010/main" val="1500885899"/>
       </p:ext>
     </p:extLst>
   </p:cSld>

</xml_diff>

<commit_message>
slides on plotting and groupby
</commit_message>
<xml_diff>
--- a/Pandas_Training_Slides.pptx
+++ b/Pandas_Training_Slides.pptx
@@ -5,7 +5,7 @@
     <p:sldMasterId id="2147483648" r:id="rId1"/>
   </p:sldMasterIdLst>
   <p:notesMasterIdLst>
-    <p:notesMasterId r:id="rId11"/>
+    <p:notesMasterId r:id="rId13"/>
   </p:notesMasterIdLst>
   <p:sldIdLst>
     <p:sldId id="263" r:id="rId2"/>
@@ -16,7 +16,9 @@
     <p:sldId id="264" r:id="rId7"/>
     <p:sldId id="258" r:id="rId8"/>
     <p:sldId id="259" r:id="rId9"/>
-    <p:sldId id="265" r:id="rId10"/>
+    <p:sldId id="266" r:id="rId10"/>
+    <p:sldId id="267" r:id="rId11"/>
+    <p:sldId id="265" r:id="rId12"/>
   </p:sldIdLst>
   <p:sldSz cx="12192000" cy="6858000"/>
   <p:notesSz cx="6858000" cy="9144000"/>
@@ -204,7 +206,7 @@
           </a:lstStyle>
           <a:p>
             <a:fld id="{E57A08F2-BB89-A243-B58E-EF977EF4C386}" type="datetimeFigureOut">
-              <a:t>11/01/2021</a:t>
+              <a:t>14/01/2021</a:t>
             </a:fld>
             <a:endParaRPr lang="en-NL"/>
           </a:p>
@@ -517,7 +519,7 @@
           <a:p>
             <a:r>
               <a:rPr lang="en-NL"/>
-              <a:t>but also easy way to access api’s, scheduling using Airflow, webscraping with beautifulsoup, scrapy etc.</a:t>
+              <a:t>ik heb geprobeerd de cursus terug te brengen tot de bare essentials</a:t>
             </a:r>
           </a:p>
         </p:txBody>
@@ -538,7 +540,8 @@
           <a:lstStyle/>
           <a:p>
             <a:fld id="{182B101C-A8DC-374B-816A-E743FC59D6B0}" type="slidenum">
-              <a:t>2</a:t>
+              <a:rPr lang="en-NL"/>
+              <a:t>1</a:t>
             </a:fld>
             <a:endParaRPr lang="en-NL"/>
           </a:p>
@@ -547,7 +550,7 @@
     </p:spTree>
     <p:extLst>
       <p:ext uri="{BB962C8B-B14F-4D97-AF65-F5344CB8AC3E}">
-        <p14:creationId xmlns:p14="http://schemas.microsoft.com/office/powerpoint/2010/main" val="1639698602"/>
+        <p14:creationId xmlns:p14="http://schemas.microsoft.com/office/powerpoint/2010/main" val="3094612982"/>
       </p:ext>
     </p:extLst>
   </p:cSld>
@@ -603,7 +606,7 @@
           <a:p>
             <a:r>
               <a:rPr lang="en-NL"/>
-              <a:t>grote voordeel: 1 library die ergens heel erg goed in is</a:t>
+              <a:t>but also easy way to access api’s, scheduling using Airflow, webscraping with beautifulsoup, scrapy etc.</a:t>
             </a:r>
           </a:p>
         </p:txBody>
@@ -624,7 +627,7 @@
           <a:lstStyle/>
           <a:p>
             <a:fld id="{182B101C-A8DC-374B-816A-E743FC59D6B0}" type="slidenum">
-              <a:t>3</a:t>
+              <a:t>2</a:t>
             </a:fld>
             <a:endParaRPr lang="en-NL"/>
           </a:p>
@@ -633,7 +636,7 @@
     </p:spTree>
     <p:extLst>
       <p:ext uri="{BB962C8B-B14F-4D97-AF65-F5344CB8AC3E}">
-        <p14:creationId xmlns:p14="http://schemas.microsoft.com/office/powerpoint/2010/main" val="3081927841"/>
+        <p14:creationId xmlns:p14="http://schemas.microsoft.com/office/powerpoint/2010/main" val="1639698602"/>
       </p:ext>
     </p:extLst>
   </p:cSld>
@@ -689,7 +692,7 @@
           <a:p>
             <a:r>
               <a:rPr lang="en-NL"/>
-              <a:t>jupyter notebook for commenting and interactive data analysis, IDE is handier for writing production code, although Microsoft also makes it a lot easier to use Visual Studio as a notebook environment</a:t>
+              <a:t>grote voordeel: 1 library die ergens heel erg goed in is</a:t>
             </a:r>
           </a:p>
         </p:txBody>
@@ -710,8 +713,7 @@
           <a:lstStyle/>
           <a:p>
             <a:fld id="{182B101C-A8DC-374B-816A-E743FC59D6B0}" type="slidenum">
-              <a:rPr lang="en-NL"/>
-              <a:t>4</a:t>
+              <a:t>3</a:t>
             </a:fld>
             <a:endParaRPr lang="en-NL"/>
           </a:p>
@@ -720,7 +722,7 @@
     </p:spTree>
     <p:extLst>
       <p:ext uri="{BB962C8B-B14F-4D97-AF65-F5344CB8AC3E}">
-        <p14:creationId xmlns:p14="http://schemas.microsoft.com/office/powerpoint/2010/main" val="2866973064"/>
+        <p14:creationId xmlns:p14="http://schemas.microsoft.com/office/powerpoint/2010/main" val="3081927841"/>
       </p:ext>
     </p:extLst>
   </p:cSld>
@@ -776,7 +778,7 @@
           <a:p>
             <a:r>
               <a:rPr lang="en-NL"/>
-              <a:t>pandas mostly excels in data wrangling and analysis. Visualization could also be done in PowerBI or Tableau. I use SQL to get data and pandas to wrangle.</a:t>
+              <a:t>jupyter notebook for commenting and interactive data analysis, IDE is handier for writing production code, although Microsoft also makes it a lot easier to use Visual Studio as a notebook environment</a:t>
             </a:r>
           </a:p>
         </p:txBody>
@@ -798,7 +800,7 @@
           <a:p>
             <a:fld id="{182B101C-A8DC-374B-816A-E743FC59D6B0}" type="slidenum">
               <a:rPr lang="en-NL"/>
-              <a:t>6</a:t>
+              <a:t>4</a:t>
             </a:fld>
             <a:endParaRPr lang="en-NL"/>
           </a:p>
@@ -807,7 +809,7 @@
     </p:spTree>
     <p:extLst>
       <p:ext uri="{BB962C8B-B14F-4D97-AF65-F5344CB8AC3E}">
-        <p14:creationId xmlns:p14="http://schemas.microsoft.com/office/powerpoint/2010/main" val="2237721319"/>
+        <p14:creationId xmlns:p14="http://schemas.microsoft.com/office/powerpoint/2010/main" val="2866973064"/>
       </p:ext>
     </p:extLst>
   </p:cSld>
@@ -863,6 +865,93 @@
           <a:p>
             <a:r>
               <a:rPr lang="en-NL"/>
+              <a:t>pandas mostly excels in data wrangling and analysis. Visualization could also be done in PowerBI or Tableau. I use SQL to get data and pandas to wrangle.</a:t>
+            </a:r>
+          </a:p>
+        </p:txBody>
+      </p:sp>
+      <p:sp>
+        <p:nvSpPr>
+          <p:cNvPr id="4" name="Slide Number Placeholder 3"/>
+          <p:cNvSpPr>
+            <a:spLocks noGrp="1"/>
+          </p:cNvSpPr>
+          <p:nvPr>
+            <p:ph type="sldNum" sz="quarter" idx="5"/>
+          </p:nvPr>
+        </p:nvSpPr>
+        <p:spPr/>
+        <p:txBody>
+          <a:bodyPr/>
+          <a:lstStyle/>
+          <a:p>
+            <a:fld id="{182B101C-A8DC-374B-816A-E743FC59D6B0}" type="slidenum">
+              <a:rPr lang="en-NL"/>
+              <a:t>6</a:t>
+            </a:fld>
+            <a:endParaRPr lang="en-NL"/>
+          </a:p>
+        </p:txBody>
+      </p:sp>
+    </p:spTree>
+    <p:extLst>
+      <p:ext uri="{BB962C8B-B14F-4D97-AF65-F5344CB8AC3E}">
+        <p14:creationId xmlns:p14="http://schemas.microsoft.com/office/powerpoint/2010/main" val="2237721319"/>
+      </p:ext>
+    </p:extLst>
+  </p:cSld>
+  <p:clrMapOvr>
+    <a:masterClrMapping/>
+  </p:clrMapOvr>
+</p:notes>
+</file>
+
+<file path=ppt/notesSlides/notesSlide6.xml><?xml version="1.0" encoding="utf-8"?>
+<p:notes xmlns:a="http://schemas.openxmlformats.org/drawingml/2006/main" xmlns:r="http://schemas.openxmlformats.org/officeDocument/2006/relationships" xmlns:p="http://schemas.openxmlformats.org/presentationml/2006/main">
+  <p:cSld>
+    <p:spTree>
+      <p:nvGrpSpPr>
+        <p:cNvPr id="1" name=""/>
+        <p:cNvGrpSpPr/>
+        <p:nvPr/>
+      </p:nvGrpSpPr>
+      <p:grpSpPr>
+        <a:xfrm>
+          <a:off x="0" y="0"/>
+          <a:ext cx="0" cy="0"/>
+          <a:chOff x="0" y="0"/>
+          <a:chExt cx="0" cy="0"/>
+        </a:xfrm>
+      </p:grpSpPr>
+      <p:sp>
+        <p:nvSpPr>
+          <p:cNvPr id="2" name="Slide Image Placeholder 1"/>
+          <p:cNvSpPr>
+            <a:spLocks noGrp="1" noRot="1" noChangeAspect="1"/>
+          </p:cNvSpPr>
+          <p:nvPr>
+            <p:ph type="sldImg"/>
+          </p:nvPr>
+        </p:nvSpPr>
+        <p:spPr/>
+      </p:sp>
+      <p:sp>
+        <p:nvSpPr>
+          <p:cNvPr id="3" name="Notes Placeholder 2"/>
+          <p:cNvSpPr>
+            <a:spLocks noGrp="1"/>
+          </p:cNvSpPr>
+          <p:nvPr>
+            <p:ph type="body" idx="1"/>
+          </p:nvPr>
+        </p:nvSpPr>
+        <p:spPr/>
+        <p:txBody>
+          <a:bodyPr/>
+          <a:lstStyle/>
+          <a:p>
+            <a:r>
+              <a:rPr lang="en-NL"/>
               <a:t>pandas series are just one column of your data, they are 1 dimensional</a:t>
             </a:r>
           </a:p>
@@ -918,7 +1007,7 @@
 </p:notes>
 </file>
 
-<file path=ppt/notesSlides/notesSlide6.xml><?xml version="1.0" encoding="utf-8"?>
+<file path=ppt/notesSlides/notesSlide7.xml><?xml version="1.0" encoding="utf-8"?>
 <p:notes xmlns:a="http://schemas.openxmlformats.org/drawingml/2006/main" xmlns:r="http://schemas.openxmlformats.org/officeDocument/2006/relationships" xmlns:p="http://schemas.openxmlformats.org/presentationml/2006/main">
   <p:cSld>
     <p:spTree>
@@ -1152,7 +1241,7 @@
           <a:lstStyle/>
           <a:p>
             <a:fld id="{595B5CFB-66E7-284C-9A5B-718B2335AB36}" type="datetimeFigureOut">
-              <a:t>11/01/2021</a:t>
+              <a:t>14/01/2021</a:t>
             </a:fld>
             <a:endParaRPr lang="en-NL"/>
           </a:p>
@@ -1350,7 +1439,7 @@
           <a:lstStyle/>
           <a:p>
             <a:fld id="{595B5CFB-66E7-284C-9A5B-718B2335AB36}" type="datetimeFigureOut">
-              <a:t>11/01/2021</a:t>
+              <a:t>14/01/2021</a:t>
             </a:fld>
             <a:endParaRPr lang="en-NL"/>
           </a:p>
@@ -1558,7 +1647,7 @@
           <a:lstStyle/>
           <a:p>
             <a:fld id="{595B5CFB-66E7-284C-9A5B-718B2335AB36}" type="datetimeFigureOut">
-              <a:t>11/01/2021</a:t>
+              <a:t>14/01/2021</a:t>
             </a:fld>
             <a:endParaRPr lang="en-NL"/>
           </a:p>
@@ -1756,7 +1845,7 @@
           <a:lstStyle/>
           <a:p>
             <a:fld id="{595B5CFB-66E7-284C-9A5B-718B2335AB36}" type="datetimeFigureOut">
-              <a:t>11/01/2021</a:t>
+              <a:t>14/01/2021</a:t>
             </a:fld>
             <a:endParaRPr lang="en-NL"/>
           </a:p>
@@ -2030,7 +2119,7 @@
           <a:lstStyle/>
           <a:p>
             <a:fld id="{595B5CFB-66E7-284C-9A5B-718B2335AB36}" type="datetimeFigureOut">
-              <a:t>11/01/2021</a:t>
+              <a:t>14/01/2021</a:t>
             </a:fld>
             <a:endParaRPr lang="en-NL"/>
           </a:p>
@@ -2296,7 +2385,7 @@
           <a:lstStyle/>
           <a:p>
             <a:fld id="{595B5CFB-66E7-284C-9A5B-718B2335AB36}" type="datetimeFigureOut">
-              <a:t>11/01/2021</a:t>
+              <a:t>14/01/2021</a:t>
             </a:fld>
             <a:endParaRPr lang="en-NL"/>
           </a:p>
@@ -2709,7 +2798,7 @@
           <a:lstStyle/>
           <a:p>
             <a:fld id="{595B5CFB-66E7-284C-9A5B-718B2335AB36}" type="datetimeFigureOut">
-              <a:t>11/01/2021</a:t>
+              <a:t>14/01/2021</a:t>
             </a:fld>
             <a:endParaRPr lang="en-NL"/>
           </a:p>
@@ -2849,7 +2938,7 @@
           <a:lstStyle/>
           <a:p>
             <a:fld id="{595B5CFB-66E7-284C-9A5B-718B2335AB36}" type="datetimeFigureOut">
-              <a:t>11/01/2021</a:t>
+              <a:t>14/01/2021</a:t>
             </a:fld>
             <a:endParaRPr lang="en-NL"/>
           </a:p>
@@ -2960,7 +3049,7 @@
           <a:lstStyle/>
           <a:p>
             <a:fld id="{595B5CFB-66E7-284C-9A5B-718B2335AB36}" type="datetimeFigureOut">
-              <a:t>11/01/2021</a:t>
+              <a:t>14/01/2021</a:t>
             </a:fld>
             <a:endParaRPr lang="en-NL"/>
           </a:p>
@@ -3271,7 +3360,7 @@
           <a:lstStyle/>
           <a:p>
             <a:fld id="{595B5CFB-66E7-284C-9A5B-718B2335AB36}" type="datetimeFigureOut">
-              <a:t>11/01/2021</a:t>
+              <a:t>14/01/2021</a:t>
             </a:fld>
             <a:endParaRPr lang="en-NL"/>
           </a:p>
@@ -3558,7 +3647,7 @@
           <a:lstStyle/>
           <a:p>
             <a:fld id="{595B5CFB-66E7-284C-9A5B-718B2335AB36}" type="datetimeFigureOut">
-              <a:t>11/01/2021</a:t>
+              <a:t>14/01/2021</a:t>
             </a:fld>
             <a:endParaRPr lang="en-NL"/>
           </a:p>
@@ -3799,7 +3888,7 @@
           </a:lstStyle>
           <a:p>
             <a:fld id="{595B5CFB-66E7-284C-9A5B-718B2335AB36}" type="datetimeFigureOut">
-              <a:t>11/01/2021</a:t>
+              <a:t>14/01/2021</a:t>
             </a:fld>
             <a:endParaRPr lang="en-NL"/>
           </a:p>
@@ -4357,37 +4446,37 @@
           <a:p>
             <a:r>
               <a:rPr lang="en-NL" sz="2600"/>
-              <a:t>Data inlezen   			---&gt; pd.read_csv()</a:t>
+              <a:t>Data inlezen   				---&gt; pd.read_csv()</a:t>
             </a:r>
           </a:p>
           <a:p>
             <a:r>
               <a:rPr lang="en-NL" sz="2600"/>
-              <a:t>Data inspectie 			---&gt; df.info()   df.head()    df.describe()</a:t>
+              <a:t>Data inspectie 				---&gt; df.info()   df.head()    df.describe()</a:t>
             </a:r>
           </a:p>
           <a:p>
             <a:r>
               <a:rPr lang="en-NL" sz="2600"/>
-              <a:t>Data selectie 			---&gt; df[df.column == ‘value’]   df.loc[df.column == ‘value’]  df.query()</a:t>
+              <a:t>Data selectie 				---&gt; df[df.column == ‘value’]   df.loc[df.column == ‘value’, :]</a:t>
             </a:r>
           </a:p>
           <a:p>
             <a:r>
               <a:rPr lang="en-NL" sz="2600"/>
-              <a:t>Data wrangling 	                                   ---&gt; df[‘column’].fillna()  of df.drop_duplicates()</a:t>
+              <a:t>Data wrangling 	                                   	---&gt; df[‘column’].fillna()  of df.drop_duplicates()</a:t>
             </a:r>
           </a:p>
           <a:p>
             <a:r>
               <a:rPr lang="en-NL" sz="2600"/>
-              <a:t>Data joinen   		                  ---&gt; df.merge(df2)</a:t>
+              <a:t>Data joinen   		                 		 ---&gt; df.merge(df2)</a:t>
             </a:r>
           </a:p>
           <a:p>
             <a:r>
               <a:rPr lang="en-NL" sz="2600"/>
-              <a:t>Data visualisatie 	                     	</a:t>
+              <a:t>Data visualisatie 	                     		</a:t>
             </a:r>
             <a:r>
               <a:rPr lang="en-NL" sz="2600">
@@ -4403,7 +4492,7 @@
           <a:p>
             <a:r>
               <a:rPr lang="en-NL" sz="2600"/>
-              <a:t>Eigen functies toepassen              	-</a:t>
+              <a:t>Eigen functies toepassen              		-</a:t>
             </a:r>
             <a:r>
               <a:rPr lang="en-NL" sz="2600">
@@ -4415,6 +4504,19 @@
               <a:rPr lang="en-NL" sz="2600"/>
               <a:t>df.apply(my_own_function)</a:t>
             </a:r>
+          </a:p>
+          <a:p>
+            <a:r>
+              <a:rPr lang="en-NL" sz="2600"/>
+              <a:t>Installeren Jupyter + Python + Pandas	-</a:t>
+            </a:r>
+            <a:r>
+              <a:rPr lang="en-NL" sz="2600">
+                <a:sym typeface="Wingdings" pitchFamily="2" charset="2"/>
+              </a:rPr>
+              <a:t>--&gt; pip install pandas</a:t>
+            </a:r>
+            <a:endParaRPr lang="en-NL" sz="2600"/>
           </a:p>
           <a:p>
             <a:endParaRPr lang="en-NL"/>
@@ -4453,6 +4555,1404 @@
     <p:extLst>
       <p:ext uri="{BB962C8B-B14F-4D97-AF65-F5344CB8AC3E}">
         <p14:creationId xmlns:p14="http://schemas.microsoft.com/office/powerpoint/2010/main" val="1512373698"/>
+      </p:ext>
+    </p:extLst>
+  </p:cSld>
+  <p:clrMapOvr>
+    <a:masterClrMapping/>
+  </p:clrMapOvr>
+</p:sld>
+</file>
+
+<file path=ppt/slides/slide10.xml><?xml version="1.0" encoding="utf-8"?>
+<p:sld xmlns:a="http://schemas.openxmlformats.org/drawingml/2006/main" xmlns:r="http://schemas.openxmlformats.org/officeDocument/2006/relationships" xmlns:p="http://schemas.openxmlformats.org/presentationml/2006/main">
+  <p:cSld>
+    <p:bg>
+      <p:bgPr>
+        <a:solidFill>
+          <a:schemeClr val="bg2"/>
+        </a:solidFill>
+        <a:effectLst/>
+      </p:bgPr>
+    </p:bg>
+    <p:spTree>
+      <p:nvGrpSpPr>
+        <p:cNvPr id="1" name=""/>
+        <p:cNvGrpSpPr/>
+        <p:nvPr/>
+      </p:nvGrpSpPr>
+      <p:grpSpPr>
+        <a:xfrm>
+          <a:off x="0" y="0"/>
+          <a:ext cx="0" cy="0"/>
+          <a:chOff x="0" y="0"/>
+          <a:chExt cx="0" cy="0"/>
+        </a:xfrm>
+      </p:grpSpPr>
+      <p:sp useBgFill="1">
+        <p:nvSpPr>
+          <p:cNvPr id="10" name="Rectangle 9">
+            <a:extLst>
+              <a:ext uri="{FF2B5EF4-FFF2-40B4-BE49-F238E27FC236}">
+                <a16:creationId xmlns:a16="http://schemas.microsoft.com/office/drawing/2014/main" id="{53F29798-D584-4792-9B62-3F5F5C36D619}"/>
+              </a:ext>
+              <a:ext uri="{C183D7F6-B498-43B3-948B-1728B52AA6E4}">
+                <adec:decorative xmlns:adec="http://schemas.microsoft.com/office/drawing/2017/decorative" val="1"/>
+              </a:ext>
+            </a:extLst>
+          </p:cNvPr>
+          <p:cNvSpPr>
+            <a:spLocks noGrp="1" noRot="1" noChangeAspect="1" noMove="1" noResize="1" noEditPoints="1" noAdjustHandles="1" noChangeArrowheads="1" noChangeShapeType="1" noTextEdit="1"/>
+          </p:cNvSpPr>
+          <p:nvPr>
+            <p:extLst>
+              <p:ext uri="{386F3935-93C4-4BCD-93E2-E3B085C9AB24}">
+                <p16:designElem xmlns:p16="http://schemas.microsoft.com/office/powerpoint/2015/main" val="1"/>
+              </p:ext>
+            </p:extLst>
+          </p:nvPr>
+        </p:nvSpPr>
+        <p:spPr>
+          <a:xfrm>
+            <a:off x="0" y="0"/>
+            <a:ext cx="12188952" cy="6858000"/>
+          </a:xfrm>
+          <a:prstGeom prst="rect">
+            <a:avLst/>
+          </a:prstGeom>
+          <a:ln>
+            <a:noFill/>
+          </a:ln>
+        </p:spPr>
+        <p:style>
+          <a:lnRef idx="2">
+            <a:schemeClr val="accent1">
+              <a:shade val="50000"/>
+            </a:schemeClr>
+          </a:lnRef>
+          <a:fillRef idx="1">
+            <a:schemeClr val="accent1"/>
+          </a:fillRef>
+          <a:effectRef idx="0">
+            <a:schemeClr val="accent1"/>
+          </a:effectRef>
+          <a:fontRef idx="minor">
+            <a:schemeClr val="lt1"/>
+          </a:fontRef>
+        </p:style>
+        <p:txBody>
+          <a:bodyPr rtlCol="0" anchor="ctr"/>
+          <a:lstStyle/>
+          <a:p>
+            <a:pPr algn="ctr"/>
+            <a:endParaRPr lang="en-US"/>
+          </a:p>
+        </p:txBody>
+      </p:sp>
+      <p:sp>
+        <p:nvSpPr>
+          <p:cNvPr id="47" name="Rectangle 46">
+            <a:extLst>
+              <a:ext uri="{FF2B5EF4-FFF2-40B4-BE49-F238E27FC236}">
+                <a16:creationId xmlns:a16="http://schemas.microsoft.com/office/drawing/2014/main" id="{E689BA12-C726-A842-A5F4-20EBD6F99509}"/>
+              </a:ext>
+            </a:extLst>
+          </p:cNvPr>
+          <p:cNvSpPr/>
+          <p:nvPr/>
+        </p:nvSpPr>
+        <p:spPr>
+          <a:xfrm>
+            <a:off x="6897919" y="1901369"/>
+            <a:ext cx="4840504" cy="4838649"/>
+          </a:xfrm>
+          <a:prstGeom prst="rect">
+            <a:avLst/>
+          </a:prstGeom>
+          <a:solidFill>
+            <a:schemeClr val="bg1"/>
+          </a:solidFill>
+        </p:spPr>
+        <p:style>
+          <a:lnRef idx="2">
+            <a:schemeClr val="accent1">
+              <a:shade val="50000"/>
+            </a:schemeClr>
+          </a:lnRef>
+          <a:fillRef idx="1">
+            <a:schemeClr val="accent1"/>
+          </a:fillRef>
+          <a:effectRef idx="0">
+            <a:schemeClr val="accent1"/>
+          </a:effectRef>
+          <a:fontRef idx="minor">
+            <a:schemeClr val="lt1"/>
+          </a:fontRef>
+        </p:style>
+        <p:txBody>
+          <a:bodyPr rtlCol="0" anchor="ctr"/>
+          <a:lstStyle/>
+          <a:p>
+            <a:pPr algn="ctr"/>
+            <a:endParaRPr lang="en-NL"/>
+          </a:p>
+        </p:txBody>
+      </p:sp>
+      <p:sp>
+        <p:nvSpPr>
+          <p:cNvPr id="41" name="Rectangle 40">
+            <a:extLst>
+              <a:ext uri="{FF2B5EF4-FFF2-40B4-BE49-F238E27FC236}">
+                <a16:creationId xmlns:a16="http://schemas.microsoft.com/office/drawing/2014/main" id="{B61828AE-5574-C14E-9CC2-15205B96045C}"/>
+              </a:ext>
+            </a:extLst>
+          </p:cNvPr>
+          <p:cNvSpPr/>
+          <p:nvPr/>
+        </p:nvSpPr>
+        <p:spPr>
+          <a:xfrm>
+            <a:off x="435427" y="1901370"/>
+            <a:ext cx="4840504" cy="4838649"/>
+          </a:xfrm>
+          <a:prstGeom prst="rect">
+            <a:avLst/>
+          </a:prstGeom>
+          <a:solidFill>
+            <a:schemeClr val="bg1"/>
+          </a:solidFill>
+        </p:spPr>
+        <p:style>
+          <a:lnRef idx="2">
+            <a:schemeClr val="accent1">
+              <a:shade val="50000"/>
+            </a:schemeClr>
+          </a:lnRef>
+          <a:fillRef idx="1">
+            <a:schemeClr val="accent1"/>
+          </a:fillRef>
+          <a:effectRef idx="0">
+            <a:schemeClr val="accent1"/>
+          </a:effectRef>
+          <a:fontRef idx="minor">
+            <a:schemeClr val="lt1"/>
+          </a:fontRef>
+        </p:style>
+        <p:txBody>
+          <a:bodyPr rtlCol="0" anchor="ctr"/>
+          <a:lstStyle/>
+          <a:p>
+            <a:pPr algn="ctr"/>
+            <a:endParaRPr lang="en-NL"/>
+          </a:p>
+        </p:txBody>
+      </p:sp>
+      <p:sp>
+        <p:nvSpPr>
+          <p:cNvPr id="2" name="Title 1">
+            <a:extLst>
+              <a:ext uri="{FF2B5EF4-FFF2-40B4-BE49-F238E27FC236}">
+                <a16:creationId xmlns:a16="http://schemas.microsoft.com/office/drawing/2014/main" id="{C8163A18-D894-FF42-A3CF-D81F0CB8B8FF}"/>
+              </a:ext>
+            </a:extLst>
+          </p:cNvPr>
+          <p:cNvSpPr>
+            <a:spLocks noGrp="1"/>
+          </p:cNvSpPr>
+          <p:nvPr>
+            <p:ph type="title"/>
+          </p:nvPr>
+        </p:nvSpPr>
+        <p:spPr>
+          <a:xfrm>
+            <a:off x="0" y="1"/>
+            <a:ext cx="12192000" cy="1690688"/>
+          </a:xfrm>
+          <a:solidFill>
+            <a:schemeClr val="bg1"/>
+          </a:solidFill>
+        </p:spPr>
+        <p:txBody>
+          <a:bodyPr vert="horz" lIns="91440" tIns="45720" rIns="91440" bIns="45720" rtlCol="0" anchor="ctr">
+            <a:normAutofit/>
+          </a:bodyPr>
+          <a:lstStyle/>
+          <a:p>
+            <a:pPr algn="ctr"/>
+            <a:r>
+              <a:rPr lang="en-US" sz="5200"/>
+              <a:t>So my advice is: only focus on these</a:t>
+            </a:r>
+          </a:p>
+        </p:txBody>
+      </p:sp>
+      <p:sp>
+        <p:nvSpPr>
+          <p:cNvPr id="4" name="Rounded Rectangle 3">
+            <a:extLst>
+              <a:ext uri="{FF2B5EF4-FFF2-40B4-BE49-F238E27FC236}">
+                <a16:creationId xmlns:a16="http://schemas.microsoft.com/office/drawing/2014/main" id="{5BE37FEB-4068-7849-B48A-BFC661116E64}"/>
+              </a:ext>
+            </a:extLst>
+          </p:cNvPr>
+          <p:cNvSpPr/>
+          <p:nvPr/>
+        </p:nvSpPr>
+        <p:spPr>
+          <a:xfrm>
+            <a:off x="769257" y="2119085"/>
+            <a:ext cx="4209143" cy="740229"/>
+          </a:xfrm>
+          <a:prstGeom prst="roundRect">
+            <a:avLst/>
+          </a:prstGeom>
+          <a:solidFill>
+            <a:schemeClr val="bg1"/>
+          </a:solidFill>
+        </p:spPr>
+        <p:style>
+          <a:lnRef idx="2">
+            <a:schemeClr val="accent1">
+              <a:shade val="50000"/>
+            </a:schemeClr>
+          </a:lnRef>
+          <a:fillRef idx="1">
+            <a:schemeClr val="accent1"/>
+          </a:fillRef>
+          <a:effectRef idx="0">
+            <a:schemeClr val="accent1"/>
+          </a:effectRef>
+          <a:fontRef idx="minor">
+            <a:schemeClr val="lt1"/>
+          </a:fontRef>
+        </p:style>
+        <p:txBody>
+          <a:bodyPr rtlCol="0" anchor="ctr"/>
+          <a:lstStyle/>
+          <a:p>
+            <a:pPr algn="ctr"/>
+            <a:r>
+              <a:rPr lang="en-NL">
+                <a:solidFill>
+                  <a:schemeClr val="tx1"/>
+                </a:solidFill>
+              </a:rPr>
+              <a:t>STATIC PLOTTING</a:t>
+            </a:r>
+          </a:p>
+        </p:txBody>
+      </p:sp>
+      <p:sp>
+        <p:nvSpPr>
+          <p:cNvPr id="7" name="Rounded Rectangle 6">
+            <a:extLst>
+              <a:ext uri="{FF2B5EF4-FFF2-40B4-BE49-F238E27FC236}">
+                <a16:creationId xmlns:a16="http://schemas.microsoft.com/office/drawing/2014/main" id="{917E8403-B738-424E-B6D5-752827693347}"/>
+              </a:ext>
+            </a:extLst>
+          </p:cNvPr>
+          <p:cNvSpPr/>
+          <p:nvPr/>
+        </p:nvSpPr>
+        <p:spPr>
+          <a:xfrm>
+            <a:off x="7213600" y="2119084"/>
+            <a:ext cx="4209143" cy="740229"/>
+          </a:xfrm>
+          <a:prstGeom prst="roundRect">
+            <a:avLst/>
+          </a:prstGeom>
+          <a:solidFill>
+            <a:schemeClr val="bg1"/>
+          </a:solidFill>
+        </p:spPr>
+        <p:style>
+          <a:lnRef idx="2">
+            <a:schemeClr val="accent1">
+              <a:shade val="50000"/>
+            </a:schemeClr>
+          </a:lnRef>
+          <a:fillRef idx="1">
+            <a:schemeClr val="accent1"/>
+          </a:fillRef>
+          <a:effectRef idx="0">
+            <a:schemeClr val="accent1"/>
+          </a:effectRef>
+          <a:fontRef idx="minor">
+            <a:schemeClr val="lt1"/>
+          </a:fontRef>
+        </p:style>
+        <p:txBody>
+          <a:bodyPr rtlCol="0" anchor="ctr"/>
+          <a:lstStyle/>
+          <a:p>
+            <a:pPr algn="ctr"/>
+            <a:r>
+              <a:rPr lang="en-NL">
+                <a:solidFill>
+                  <a:schemeClr val="tx1"/>
+                </a:solidFill>
+              </a:rPr>
+              <a:t>INTERACTIVE PLOTTING</a:t>
+            </a:r>
+          </a:p>
+        </p:txBody>
+      </p:sp>
+      <p:sp>
+        <p:nvSpPr>
+          <p:cNvPr id="8" name="Rounded Rectangle 7">
+            <a:extLst>
+              <a:ext uri="{FF2B5EF4-FFF2-40B4-BE49-F238E27FC236}">
+                <a16:creationId xmlns:a16="http://schemas.microsoft.com/office/drawing/2014/main" id="{606054F4-B789-3E47-9289-3EF05404C167}"/>
+              </a:ext>
+            </a:extLst>
+          </p:cNvPr>
+          <p:cNvSpPr/>
+          <p:nvPr/>
+        </p:nvSpPr>
+        <p:spPr>
+          <a:xfrm>
+            <a:off x="1988456" y="3812949"/>
+            <a:ext cx="1770743" cy="740229"/>
+          </a:xfrm>
+          <a:prstGeom prst="roundRect">
+            <a:avLst/>
+          </a:prstGeom>
+          <a:solidFill>
+            <a:schemeClr val="bg1"/>
+          </a:solidFill>
+        </p:spPr>
+        <p:style>
+          <a:lnRef idx="2">
+            <a:schemeClr val="accent1">
+              <a:shade val="50000"/>
+            </a:schemeClr>
+          </a:lnRef>
+          <a:fillRef idx="1">
+            <a:schemeClr val="accent1"/>
+          </a:fillRef>
+          <a:effectRef idx="0">
+            <a:schemeClr val="accent1"/>
+          </a:effectRef>
+          <a:fontRef idx="minor">
+            <a:schemeClr val="lt1"/>
+          </a:fontRef>
+        </p:style>
+        <p:txBody>
+          <a:bodyPr rtlCol="0" anchor="ctr"/>
+          <a:lstStyle/>
+          <a:p>
+            <a:pPr algn="ctr"/>
+            <a:r>
+              <a:rPr lang="en-NL">
+                <a:solidFill>
+                  <a:schemeClr val="tx1"/>
+                </a:solidFill>
+              </a:rPr>
+              <a:t>Matplotlib</a:t>
+            </a:r>
+          </a:p>
+        </p:txBody>
+      </p:sp>
+      <p:sp>
+        <p:nvSpPr>
+          <p:cNvPr id="11" name="Rounded Rectangle 10">
+            <a:extLst>
+              <a:ext uri="{FF2B5EF4-FFF2-40B4-BE49-F238E27FC236}">
+                <a16:creationId xmlns:a16="http://schemas.microsoft.com/office/drawing/2014/main" id="{B9F9B856-E690-DC47-8B21-875974C2DA33}"/>
+              </a:ext>
+            </a:extLst>
+          </p:cNvPr>
+          <p:cNvSpPr/>
+          <p:nvPr/>
+        </p:nvSpPr>
+        <p:spPr>
+          <a:xfrm>
+            <a:off x="769257" y="5168787"/>
+            <a:ext cx="1770743" cy="740229"/>
+          </a:xfrm>
+          <a:prstGeom prst="roundRect">
+            <a:avLst/>
+          </a:prstGeom>
+          <a:solidFill>
+            <a:schemeClr val="bg1"/>
+          </a:solidFill>
+        </p:spPr>
+        <p:style>
+          <a:lnRef idx="2">
+            <a:schemeClr val="accent1">
+              <a:shade val="50000"/>
+            </a:schemeClr>
+          </a:lnRef>
+          <a:fillRef idx="1">
+            <a:schemeClr val="accent1"/>
+          </a:fillRef>
+          <a:effectRef idx="0">
+            <a:schemeClr val="accent1"/>
+          </a:effectRef>
+          <a:fontRef idx="minor">
+            <a:schemeClr val="lt1"/>
+          </a:fontRef>
+        </p:style>
+        <p:txBody>
+          <a:bodyPr rtlCol="0" anchor="ctr"/>
+          <a:lstStyle/>
+          <a:p>
+            <a:pPr algn="ctr"/>
+            <a:r>
+              <a:rPr lang="en-NL">
+                <a:solidFill>
+                  <a:schemeClr val="tx1"/>
+                </a:solidFill>
+              </a:rPr>
+              <a:t>Seaborn</a:t>
+            </a:r>
+          </a:p>
+        </p:txBody>
+      </p:sp>
+      <p:sp>
+        <p:nvSpPr>
+          <p:cNvPr id="12" name="Rounded Rectangle 11">
+            <a:extLst>
+              <a:ext uri="{FF2B5EF4-FFF2-40B4-BE49-F238E27FC236}">
+                <a16:creationId xmlns:a16="http://schemas.microsoft.com/office/drawing/2014/main" id="{71BF929F-F7E7-7B46-A249-20543D5CE3C7}"/>
+              </a:ext>
+            </a:extLst>
+          </p:cNvPr>
+          <p:cNvSpPr/>
+          <p:nvPr/>
+        </p:nvSpPr>
+        <p:spPr>
+          <a:xfrm>
+            <a:off x="3207657" y="5168786"/>
+            <a:ext cx="1770743" cy="740229"/>
+          </a:xfrm>
+          <a:prstGeom prst="roundRect">
+            <a:avLst/>
+          </a:prstGeom>
+          <a:solidFill>
+            <a:schemeClr val="bg1"/>
+          </a:solidFill>
+        </p:spPr>
+        <p:style>
+          <a:lnRef idx="2">
+            <a:schemeClr val="accent1">
+              <a:shade val="50000"/>
+            </a:schemeClr>
+          </a:lnRef>
+          <a:fillRef idx="1">
+            <a:schemeClr val="accent1"/>
+          </a:fillRef>
+          <a:effectRef idx="0">
+            <a:schemeClr val="accent1"/>
+          </a:effectRef>
+          <a:fontRef idx="minor">
+            <a:schemeClr val="lt1"/>
+          </a:fontRef>
+        </p:style>
+        <p:txBody>
+          <a:bodyPr rtlCol="0" anchor="ctr"/>
+          <a:lstStyle/>
+          <a:p>
+            <a:pPr algn="ctr"/>
+            <a:r>
+              <a:rPr lang="en-NL">
+                <a:solidFill>
+                  <a:schemeClr val="tx1"/>
+                </a:solidFill>
+              </a:rPr>
+              <a:t>Pandas plotting</a:t>
+            </a:r>
+          </a:p>
+          <a:p>
+            <a:pPr algn="ctr"/>
+            <a:r>
+              <a:rPr lang="en-NL">
+                <a:solidFill>
+                  <a:schemeClr val="tx1"/>
+                </a:solidFill>
+              </a:rPr>
+              <a:t>df.plot()</a:t>
+            </a:r>
+          </a:p>
+        </p:txBody>
+      </p:sp>
+      <p:sp>
+        <p:nvSpPr>
+          <p:cNvPr id="13" name="Rounded Rectangle 12">
+            <a:extLst>
+              <a:ext uri="{FF2B5EF4-FFF2-40B4-BE49-F238E27FC236}">
+                <a16:creationId xmlns:a16="http://schemas.microsoft.com/office/drawing/2014/main" id="{18D8AA26-A088-FA4A-BFD8-69B20285BE7D}"/>
+              </a:ext>
+            </a:extLst>
+          </p:cNvPr>
+          <p:cNvSpPr/>
+          <p:nvPr/>
+        </p:nvSpPr>
+        <p:spPr>
+          <a:xfrm>
+            <a:off x="7213599" y="3816804"/>
+            <a:ext cx="1770743" cy="740229"/>
+          </a:xfrm>
+          <a:prstGeom prst="roundRect">
+            <a:avLst/>
+          </a:prstGeom>
+          <a:solidFill>
+            <a:schemeClr val="bg1"/>
+          </a:solidFill>
+        </p:spPr>
+        <p:style>
+          <a:lnRef idx="2">
+            <a:schemeClr val="accent1">
+              <a:shade val="50000"/>
+            </a:schemeClr>
+          </a:lnRef>
+          <a:fillRef idx="1">
+            <a:schemeClr val="accent1"/>
+          </a:fillRef>
+          <a:effectRef idx="0">
+            <a:schemeClr val="accent1"/>
+          </a:effectRef>
+          <a:fontRef idx="minor">
+            <a:schemeClr val="lt1"/>
+          </a:fontRef>
+        </p:style>
+        <p:txBody>
+          <a:bodyPr rtlCol="0" anchor="ctr"/>
+          <a:lstStyle/>
+          <a:p>
+            <a:pPr algn="ctr"/>
+            <a:r>
+              <a:rPr lang="en-NL">
+                <a:solidFill>
+                  <a:schemeClr val="tx1"/>
+                </a:solidFill>
+              </a:rPr>
+              <a:t>Plotly</a:t>
+            </a:r>
+          </a:p>
+        </p:txBody>
+      </p:sp>
+      <p:sp>
+        <p:nvSpPr>
+          <p:cNvPr id="14" name="Rounded Rectangle 13">
+            <a:extLst>
+              <a:ext uri="{FF2B5EF4-FFF2-40B4-BE49-F238E27FC236}">
+                <a16:creationId xmlns:a16="http://schemas.microsoft.com/office/drawing/2014/main" id="{B9F361CF-44BE-D247-A0CA-45DFA7FC17B1}"/>
+              </a:ext>
+            </a:extLst>
+          </p:cNvPr>
+          <p:cNvSpPr/>
+          <p:nvPr/>
+        </p:nvSpPr>
+        <p:spPr>
+          <a:xfrm>
+            <a:off x="9651998" y="3812949"/>
+            <a:ext cx="1770743" cy="740229"/>
+          </a:xfrm>
+          <a:prstGeom prst="roundRect">
+            <a:avLst/>
+          </a:prstGeom>
+          <a:solidFill>
+            <a:schemeClr val="bg1"/>
+          </a:solidFill>
+        </p:spPr>
+        <p:style>
+          <a:lnRef idx="2">
+            <a:schemeClr val="accent1">
+              <a:shade val="50000"/>
+            </a:schemeClr>
+          </a:lnRef>
+          <a:fillRef idx="1">
+            <a:schemeClr val="accent1"/>
+          </a:fillRef>
+          <a:effectRef idx="0">
+            <a:schemeClr val="accent1"/>
+          </a:effectRef>
+          <a:fontRef idx="minor">
+            <a:schemeClr val="lt1"/>
+          </a:fontRef>
+        </p:style>
+        <p:txBody>
+          <a:bodyPr rtlCol="0" anchor="ctr"/>
+          <a:lstStyle/>
+          <a:p>
+            <a:pPr algn="ctr"/>
+            <a:r>
+              <a:rPr lang="en-NL">
+                <a:solidFill>
+                  <a:schemeClr val="tx1"/>
+                </a:solidFill>
+              </a:rPr>
+              <a:t>Bokeh</a:t>
+            </a:r>
+          </a:p>
+        </p:txBody>
+      </p:sp>
+      <p:sp>
+        <p:nvSpPr>
+          <p:cNvPr id="15" name="Rounded Rectangle 14">
+            <a:extLst>
+              <a:ext uri="{FF2B5EF4-FFF2-40B4-BE49-F238E27FC236}">
+                <a16:creationId xmlns:a16="http://schemas.microsoft.com/office/drawing/2014/main" id="{C4B8F932-65C0-364C-A1F8-065FC81624F1}"/>
+              </a:ext>
+            </a:extLst>
+          </p:cNvPr>
+          <p:cNvSpPr/>
+          <p:nvPr/>
+        </p:nvSpPr>
+        <p:spPr>
+          <a:xfrm>
+            <a:off x="7213599" y="5168785"/>
+            <a:ext cx="1770743" cy="740229"/>
+          </a:xfrm>
+          <a:prstGeom prst="roundRect">
+            <a:avLst/>
+          </a:prstGeom>
+          <a:solidFill>
+            <a:schemeClr val="bg1"/>
+          </a:solidFill>
+        </p:spPr>
+        <p:style>
+          <a:lnRef idx="2">
+            <a:schemeClr val="accent1">
+              <a:shade val="50000"/>
+            </a:schemeClr>
+          </a:lnRef>
+          <a:fillRef idx="1">
+            <a:schemeClr val="accent1"/>
+          </a:fillRef>
+          <a:effectRef idx="0">
+            <a:schemeClr val="accent1"/>
+          </a:effectRef>
+          <a:fontRef idx="minor">
+            <a:schemeClr val="lt1"/>
+          </a:fontRef>
+        </p:style>
+        <p:txBody>
+          <a:bodyPr rtlCol="0" anchor="ctr"/>
+          <a:lstStyle/>
+          <a:p>
+            <a:pPr algn="ctr"/>
+            <a:r>
+              <a:rPr lang="en-NL">
+                <a:solidFill>
+                  <a:schemeClr val="tx1"/>
+                </a:solidFill>
+              </a:rPr>
+              <a:t>Plotly Express</a:t>
+            </a:r>
+          </a:p>
+        </p:txBody>
+      </p:sp>
+      <p:sp>
+        <p:nvSpPr>
+          <p:cNvPr id="16" name="Rounded Rectangle 15">
+            <a:extLst>
+              <a:ext uri="{FF2B5EF4-FFF2-40B4-BE49-F238E27FC236}">
+                <a16:creationId xmlns:a16="http://schemas.microsoft.com/office/drawing/2014/main" id="{115A7820-65D8-A14E-8E3F-BA4ABE5F3D4A}"/>
+              </a:ext>
+            </a:extLst>
+          </p:cNvPr>
+          <p:cNvSpPr/>
+          <p:nvPr/>
+        </p:nvSpPr>
+        <p:spPr>
+          <a:xfrm>
+            <a:off x="9651999" y="5168785"/>
+            <a:ext cx="1770743" cy="740229"/>
+          </a:xfrm>
+          <a:prstGeom prst="roundRect">
+            <a:avLst/>
+          </a:prstGeom>
+          <a:solidFill>
+            <a:schemeClr val="bg1"/>
+          </a:solidFill>
+        </p:spPr>
+        <p:style>
+          <a:lnRef idx="2">
+            <a:schemeClr val="accent1">
+              <a:shade val="50000"/>
+            </a:schemeClr>
+          </a:lnRef>
+          <a:fillRef idx="1">
+            <a:schemeClr val="accent1"/>
+          </a:fillRef>
+          <a:effectRef idx="0">
+            <a:schemeClr val="accent1"/>
+          </a:effectRef>
+          <a:fontRef idx="minor">
+            <a:schemeClr val="lt1"/>
+          </a:fontRef>
+        </p:style>
+        <p:txBody>
+          <a:bodyPr rtlCol="0" anchor="ctr"/>
+          <a:lstStyle/>
+          <a:p>
+            <a:pPr algn="ctr"/>
+            <a:r>
+              <a:rPr lang="en-NL">
+                <a:solidFill>
+                  <a:schemeClr val="tx1"/>
+                </a:solidFill>
+              </a:rPr>
+              <a:t>hvPlot</a:t>
+            </a:r>
+          </a:p>
+        </p:txBody>
+      </p:sp>
+      <p:cxnSp>
+        <p:nvCxnSpPr>
+          <p:cNvPr id="17" name="Straight Arrow Connector 16">
+            <a:extLst>
+              <a:ext uri="{FF2B5EF4-FFF2-40B4-BE49-F238E27FC236}">
+                <a16:creationId xmlns:a16="http://schemas.microsoft.com/office/drawing/2014/main" id="{A95021F4-308D-674F-A809-986678EEC2FA}"/>
+              </a:ext>
+            </a:extLst>
+          </p:cNvPr>
+          <p:cNvCxnSpPr>
+            <a:stCxn id="8" idx="2"/>
+            <a:endCxn id="11" idx="0"/>
+          </p:cNvCxnSpPr>
+          <p:nvPr/>
+        </p:nvCxnSpPr>
+        <p:spPr>
+          <a:xfrm flipH="1">
+            <a:off x="1654629" y="4553178"/>
+            <a:ext cx="1219199" cy="615609"/>
+          </a:xfrm>
+          <a:prstGeom prst="straightConnector1">
+            <a:avLst/>
+          </a:prstGeom>
+          <a:ln w="25400">
+            <a:tailEnd type="triangle"/>
+          </a:ln>
+        </p:spPr>
+        <p:style>
+          <a:lnRef idx="1">
+            <a:schemeClr val="accent1"/>
+          </a:lnRef>
+          <a:fillRef idx="0">
+            <a:schemeClr val="accent1"/>
+          </a:fillRef>
+          <a:effectRef idx="0">
+            <a:schemeClr val="accent1"/>
+          </a:effectRef>
+          <a:fontRef idx="minor">
+            <a:schemeClr val="tx1"/>
+          </a:fontRef>
+        </p:style>
+      </p:cxnSp>
+      <p:cxnSp>
+        <p:nvCxnSpPr>
+          <p:cNvPr id="20" name="Straight Arrow Connector 19">
+            <a:extLst>
+              <a:ext uri="{FF2B5EF4-FFF2-40B4-BE49-F238E27FC236}">
+                <a16:creationId xmlns:a16="http://schemas.microsoft.com/office/drawing/2014/main" id="{B2B3B61C-5960-2C43-AA68-365281AC531C}"/>
+              </a:ext>
+            </a:extLst>
+          </p:cNvPr>
+          <p:cNvCxnSpPr>
+            <a:cxnSpLocks/>
+            <a:stCxn id="8" idx="2"/>
+            <a:endCxn id="12" idx="0"/>
+          </p:cNvCxnSpPr>
+          <p:nvPr/>
+        </p:nvCxnSpPr>
+        <p:spPr>
+          <a:xfrm>
+            <a:off x="2873828" y="4553178"/>
+            <a:ext cx="1219201" cy="615608"/>
+          </a:xfrm>
+          <a:prstGeom prst="straightConnector1">
+            <a:avLst/>
+          </a:prstGeom>
+          <a:ln w="25400">
+            <a:tailEnd type="triangle"/>
+          </a:ln>
+        </p:spPr>
+        <p:style>
+          <a:lnRef idx="1">
+            <a:schemeClr val="accent1"/>
+          </a:lnRef>
+          <a:fillRef idx="0">
+            <a:schemeClr val="accent1"/>
+          </a:fillRef>
+          <a:effectRef idx="0">
+            <a:schemeClr val="accent1"/>
+          </a:effectRef>
+          <a:fontRef idx="minor">
+            <a:schemeClr val="tx1"/>
+          </a:fontRef>
+        </p:style>
+      </p:cxnSp>
+      <p:cxnSp>
+        <p:nvCxnSpPr>
+          <p:cNvPr id="23" name="Straight Arrow Connector 22">
+            <a:extLst>
+              <a:ext uri="{FF2B5EF4-FFF2-40B4-BE49-F238E27FC236}">
+                <a16:creationId xmlns:a16="http://schemas.microsoft.com/office/drawing/2014/main" id="{2E9CC23E-C945-7141-9F86-4E3951FD2235}"/>
+              </a:ext>
+            </a:extLst>
+          </p:cNvPr>
+          <p:cNvCxnSpPr>
+            <a:cxnSpLocks/>
+            <a:stCxn id="4" idx="2"/>
+            <a:endCxn id="8" idx="0"/>
+          </p:cNvCxnSpPr>
+          <p:nvPr/>
+        </p:nvCxnSpPr>
+        <p:spPr>
+          <a:xfrm flipH="1">
+            <a:off x="2873828" y="2859314"/>
+            <a:ext cx="1" cy="953635"/>
+          </a:xfrm>
+          <a:prstGeom prst="straightConnector1">
+            <a:avLst/>
+          </a:prstGeom>
+          <a:ln w="25400">
+            <a:tailEnd type="triangle"/>
+          </a:ln>
+        </p:spPr>
+        <p:style>
+          <a:lnRef idx="1">
+            <a:schemeClr val="accent1"/>
+          </a:lnRef>
+          <a:fillRef idx="0">
+            <a:schemeClr val="accent1"/>
+          </a:fillRef>
+          <a:effectRef idx="0">
+            <a:schemeClr val="accent1"/>
+          </a:effectRef>
+          <a:fontRef idx="minor">
+            <a:schemeClr val="tx1"/>
+          </a:fontRef>
+        </p:style>
+      </p:cxnSp>
+      <p:cxnSp>
+        <p:nvCxnSpPr>
+          <p:cNvPr id="26" name="Straight Arrow Connector 25">
+            <a:extLst>
+              <a:ext uri="{FF2B5EF4-FFF2-40B4-BE49-F238E27FC236}">
+                <a16:creationId xmlns:a16="http://schemas.microsoft.com/office/drawing/2014/main" id="{2DCCB25D-9827-E44C-85B4-8546030450D4}"/>
+              </a:ext>
+            </a:extLst>
+          </p:cNvPr>
+          <p:cNvCxnSpPr>
+            <a:cxnSpLocks/>
+            <a:stCxn id="7" idx="2"/>
+            <a:endCxn id="13" idx="0"/>
+          </p:cNvCxnSpPr>
+          <p:nvPr/>
+        </p:nvCxnSpPr>
+        <p:spPr>
+          <a:xfrm flipH="1">
+            <a:off x="8098971" y="2859313"/>
+            <a:ext cx="1219201" cy="957491"/>
+          </a:xfrm>
+          <a:prstGeom prst="straightConnector1">
+            <a:avLst/>
+          </a:prstGeom>
+          <a:ln w="25400">
+            <a:tailEnd type="triangle"/>
+          </a:ln>
+        </p:spPr>
+        <p:style>
+          <a:lnRef idx="1">
+            <a:schemeClr val="accent1"/>
+          </a:lnRef>
+          <a:fillRef idx="0">
+            <a:schemeClr val="accent1"/>
+          </a:fillRef>
+          <a:effectRef idx="0">
+            <a:schemeClr val="accent1"/>
+          </a:effectRef>
+          <a:fontRef idx="minor">
+            <a:schemeClr val="tx1"/>
+          </a:fontRef>
+        </p:style>
+      </p:cxnSp>
+      <p:cxnSp>
+        <p:nvCxnSpPr>
+          <p:cNvPr id="29" name="Straight Arrow Connector 28">
+            <a:extLst>
+              <a:ext uri="{FF2B5EF4-FFF2-40B4-BE49-F238E27FC236}">
+                <a16:creationId xmlns:a16="http://schemas.microsoft.com/office/drawing/2014/main" id="{3DA5E321-77E3-DC4A-A990-B34AC963D47C}"/>
+              </a:ext>
+            </a:extLst>
+          </p:cNvPr>
+          <p:cNvCxnSpPr>
+            <a:cxnSpLocks/>
+            <a:stCxn id="13" idx="2"/>
+            <a:endCxn id="15" idx="0"/>
+          </p:cNvCxnSpPr>
+          <p:nvPr/>
+        </p:nvCxnSpPr>
+        <p:spPr>
+          <a:xfrm>
+            <a:off x="8098971" y="4557033"/>
+            <a:ext cx="0" cy="611752"/>
+          </a:xfrm>
+          <a:prstGeom prst="straightConnector1">
+            <a:avLst/>
+          </a:prstGeom>
+          <a:ln w="25400">
+            <a:tailEnd type="triangle"/>
+          </a:ln>
+        </p:spPr>
+        <p:style>
+          <a:lnRef idx="1">
+            <a:schemeClr val="accent1"/>
+          </a:lnRef>
+          <a:fillRef idx="0">
+            <a:schemeClr val="accent1"/>
+          </a:fillRef>
+          <a:effectRef idx="0">
+            <a:schemeClr val="accent1"/>
+          </a:effectRef>
+          <a:fontRef idx="minor">
+            <a:schemeClr val="tx1"/>
+          </a:fontRef>
+        </p:style>
+      </p:cxnSp>
+      <p:cxnSp>
+        <p:nvCxnSpPr>
+          <p:cNvPr id="32" name="Straight Arrow Connector 31">
+            <a:extLst>
+              <a:ext uri="{FF2B5EF4-FFF2-40B4-BE49-F238E27FC236}">
+                <a16:creationId xmlns:a16="http://schemas.microsoft.com/office/drawing/2014/main" id="{50642BE9-05E2-3B41-8204-80E2B59480FB}"/>
+              </a:ext>
+            </a:extLst>
+          </p:cNvPr>
+          <p:cNvCxnSpPr>
+            <a:cxnSpLocks/>
+            <a:stCxn id="7" idx="2"/>
+            <a:endCxn id="14" idx="0"/>
+          </p:cNvCxnSpPr>
+          <p:nvPr/>
+        </p:nvCxnSpPr>
+        <p:spPr>
+          <a:xfrm>
+            <a:off x="9318172" y="2859313"/>
+            <a:ext cx="1219198" cy="953636"/>
+          </a:xfrm>
+          <a:prstGeom prst="straightConnector1">
+            <a:avLst/>
+          </a:prstGeom>
+          <a:ln w="25400">
+            <a:tailEnd type="triangle"/>
+          </a:ln>
+        </p:spPr>
+        <p:style>
+          <a:lnRef idx="1">
+            <a:schemeClr val="accent1"/>
+          </a:lnRef>
+          <a:fillRef idx="0">
+            <a:schemeClr val="accent1"/>
+          </a:fillRef>
+          <a:effectRef idx="0">
+            <a:schemeClr val="accent1"/>
+          </a:effectRef>
+          <a:fontRef idx="minor">
+            <a:schemeClr val="tx1"/>
+          </a:fontRef>
+        </p:style>
+      </p:cxnSp>
+      <p:cxnSp>
+        <p:nvCxnSpPr>
+          <p:cNvPr id="35" name="Straight Arrow Connector 34">
+            <a:extLst>
+              <a:ext uri="{FF2B5EF4-FFF2-40B4-BE49-F238E27FC236}">
+                <a16:creationId xmlns:a16="http://schemas.microsoft.com/office/drawing/2014/main" id="{4961CF21-4703-E04E-8F50-9D28559BEC4F}"/>
+              </a:ext>
+            </a:extLst>
+          </p:cNvPr>
+          <p:cNvCxnSpPr>
+            <a:cxnSpLocks/>
+            <a:stCxn id="14" idx="2"/>
+            <a:endCxn id="16" idx="0"/>
+          </p:cNvCxnSpPr>
+          <p:nvPr/>
+        </p:nvCxnSpPr>
+        <p:spPr>
+          <a:xfrm>
+            <a:off x="10537370" y="4553178"/>
+            <a:ext cx="1" cy="615607"/>
+          </a:xfrm>
+          <a:prstGeom prst="straightConnector1">
+            <a:avLst/>
+          </a:prstGeom>
+          <a:ln w="25400">
+            <a:tailEnd type="triangle"/>
+          </a:ln>
+        </p:spPr>
+        <p:style>
+          <a:lnRef idx="1">
+            <a:schemeClr val="accent1"/>
+          </a:lnRef>
+          <a:fillRef idx="0">
+            <a:schemeClr val="accent1"/>
+          </a:fillRef>
+          <a:effectRef idx="0">
+            <a:schemeClr val="accent1"/>
+          </a:effectRef>
+          <a:fontRef idx="minor">
+            <a:schemeClr val="tx1"/>
+          </a:fontRef>
+        </p:style>
+      </p:cxnSp>
+      <p:pic>
+        <p:nvPicPr>
+          <p:cNvPr id="1026" name="Picture 2" descr="Plotly - Wikipedia">
+            <a:extLst>
+              <a:ext uri="{FF2B5EF4-FFF2-40B4-BE49-F238E27FC236}">
+                <a16:creationId xmlns:a16="http://schemas.microsoft.com/office/drawing/2014/main" id="{5257B108-9086-864A-AD1B-DEFB47CF360E}"/>
+              </a:ext>
+            </a:extLst>
+          </p:cNvPr>
+          <p:cNvPicPr>
+            <a:picLocks noChangeAspect="1" noChangeArrowheads="1"/>
+          </p:cNvPicPr>
+          <p:nvPr/>
+        </p:nvPicPr>
+        <p:blipFill>
+          <a:blip r:embed="rId2">
+            <a:extLst>
+              <a:ext uri="{28A0092B-C50C-407E-A947-70E740481C1C}">
+                <a14:useLocalDpi xmlns:a14="http://schemas.microsoft.com/office/drawing/2010/main" val="0"/>
+              </a:ext>
+            </a:extLst>
+          </a:blip>
+          <a:srcRect/>
+          <a:stretch>
+            <a:fillRect/>
+          </a:stretch>
+        </p:blipFill>
+        <p:spPr bwMode="auto">
+          <a:xfrm>
+            <a:off x="7228113" y="6092307"/>
+            <a:ext cx="1756229" cy="582400"/>
+          </a:xfrm>
+          <a:prstGeom prst="rect">
+            <a:avLst/>
+          </a:prstGeom>
+          <a:noFill/>
+          <a:extLst>
+            <a:ext uri="{909E8E84-426E-40DD-AFC4-6F175D3DCCD1}">
+              <a14:hiddenFill xmlns:a14="http://schemas.microsoft.com/office/drawing/2010/main">
+                <a:solidFill>
+                  <a:srgbClr val="FFFFFF"/>
+                </a:solidFill>
+              </a14:hiddenFill>
+            </a:ext>
+          </a:extLst>
+        </p:spPr>
+      </p:pic>
+      <p:pic>
+        <p:nvPicPr>
+          <p:cNvPr id="1030" name="Picture 6" descr="hvPlot 0.7.0 documentation">
+            <a:extLst>
+              <a:ext uri="{FF2B5EF4-FFF2-40B4-BE49-F238E27FC236}">
+                <a16:creationId xmlns:a16="http://schemas.microsoft.com/office/drawing/2014/main" id="{DD961E71-3DF6-0F4B-8679-DB7B2C767F15}"/>
+              </a:ext>
+            </a:extLst>
+          </p:cNvPr>
+          <p:cNvPicPr>
+            <a:picLocks noChangeAspect="1" noChangeArrowheads="1"/>
+          </p:cNvPicPr>
+          <p:nvPr/>
+        </p:nvPicPr>
+        <p:blipFill>
+          <a:blip r:embed="rId3">
+            <a:extLst>
+              <a:ext uri="{28A0092B-C50C-407E-A947-70E740481C1C}">
+                <a14:useLocalDpi xmlns:a14="http://schemas.microsoft.com/office/drawing/2010/main" val="0"/>
+              </a:ext>
+            </a:extLst>
+          </a:blip>
+          <a:srcRect/>
+          <a:stretch>
+            <a:fillRect/>
+          </a:stretch>
+        </p:blipFill>
+        <p:spPr bwMode="auto">
+          <a:xfrm>
+            <a:off x="9753597" y="6122421"/>
+            <a:ext cx="1567545" cy="486211"/>
+          </a:xfrm>
+          <a:prstGeom prst="rect">
+            <a:avLst/>
+          </a:prstGeom>
+          <a:noFill/>
+          <a:extLst>
+            <a:ext uri="{909E8E84-426E-40DD-AFC4-6F175D3DCCD1}">
+              <a14:hiddenFill xmlns:a14="http://schemas.microsoft.com/office/drawing/2010/main">
+                <a:solidFill>
+                  <a:srgbClr val="FFFFFF"/>
+                </a:solidFill>
+              </a14:hiddenFill>
+            </a:ext>
+          </a:extLst>
+        </p:spPr>
+      </p:pic>
+      <p:pic>
+        <p:nvPicPr>
+          <p:cNvPr id="1032" name="Picture 8" descr="pandas (software) - Wikipedia">
+            <a:extLst>
+              <a:ext uri="{FF2B5EF4-FFF2-40B4-BE49-F238E27FC236}">
+                <a16:creationId xmlns:a16="http://schemas.microsoft.com/office/drawing/2014/main" id="{200A321B-48E5-4245-8232-20DC348555E1}"/>
+              </a:ext>
+            </a:extLst>
+          </p:cNvPr>
+          <p:cNvPicPr>
+            <a:picLocks noChangeAspect="1" noChangeArrowheads="1"/>
+          </p:cNvPicPr>
+          <p:nvPr/>
+        </p:nvPicPr>
+        <p:blipFill>
+          <a:blip r:embed="rId4">
+            <a:extLst>
+              <a:ext uri="{28A0092B-C50C-407E-A947-70E740481C1C}">
+                <a14:useLocalDpi xmlns:a14="http://schemas.microsoft.com/office/drawing/2010/main" val="0"/>
+              </a:ext>
+            </a:extLst>
+          </a:blip>
+          <a:srcRect/>
+          <a:stretch>
+            <a:fillRect/>
+          </a:stretch>
+        </p:blipFill>
+        <p:spPr bwMode="auto">
+          <a:xfrm>
+            <a:off x="3372534" y="6026232"/>
+            <a:ext cx="1440989" cy="582400"/>
+          </a:xfrm>
+          <a:prstGeom prst="rect">
+            <a:avLst/>
+          </a:prstGeom>
+          <a:solidFill>
+            <a:schemeClr val="bg1"/>
+          </a:solidFill>
+        </p:spPr>
+      </p:pic>
+      <p:pic>
+        <p:nvPicPr>
+          <p:cNvPr id="1034" name="Picture 10" descr="seaborn: statistical data visualization — seaborn 0.11.1 documentation">
+            <a:extLst>
+              <a:ext uri="{FF2B5EF4-FFF2-40B4-BE49-F238E27FC236}">
+                <a16:creationId xmlns:a16="http://schemas.microsoft.com/office/drawing/2014/main" id="{9E658D67-A7D2-6547-8108-60398FF58448}"/>
+              </a:ext>
+            </a:extLst>
+          </p:cNvPr>
+          <p:cNvPicPr>
+            <a:picLocks noChangeAspect="1" noChangeArrowheads="1"/>
+          </p:cNvPicPr>
+          <p:nvPr/>
+        </p:nvPicPr>
+        <p:blipFill>
+          <a:blip r:embed="rId5">
+            <a:extLst>
+              <a:ext uri="{28A0092B-C50C-407E-A947-70E740481C1C}">
+                <a14:useLocalDpi xmlns:a14="http://schemas.microsoft.com/office/drawing/2010/main" val="0"/>
+              </a:ext>
+            </a:extLst>
+          </a:blip>
+          <a:srcRect/>
+          <a:stretch>
+            <a:fillRect/>
+          </a:stretch>
+        </p:blipFill>
+        <p:spPr bwMode="auto">
+          <a:xfrm>
+            <a:off x="769261" y="6083773"/>
+            <a:ext cx="1770739" cy="505925"/>
+          </a:xfrm>
+          <a:prstGeom prst="rect">
+            <a:avLst/>
+          </a:prstGeom>
+          <a:noFill/>
+          <a:extLst>
+            <a:ext uri="{909E8E84-426E-40DD-AFC4-6F175D3DCCD1}">
+              <a14:hiddenFill xmlns:a14="http://schemas.microsoft.com/office/drawing/2010/main">
+                <a:solidFill>
+                  <a:srgbClr val="FFFFFF"/>
+                </a:solidFill>
+              </a14:hiddenFill>
+            </a:ext>
+          </a:extLst>
+        </p:spPr>
+      </p:pic>
+    </p:spTree>
+    <p:extLst>
+      <p:ext uri="{BB962C8B-B14F-4D97-AF65-F5344CB8AC3E}">
+        <p14:creationId xmlns:p14="http://schemas.microsoft.com/office/powerpoint/2010/main" val="1735477267"/>
+      </p:ext>
+    </p:extLst>
+  </p:cSld>
+  <p:clrMapOvr>
+    <a:masterClrMapping/>
+  </p:clrMapOvr>
+</p:sld>
+</file>
+
+<file path=ppt/slides/slide11.xml><?xml version="1.0" encoding="utf-8"?>
+<p:sld xmlns:a="http://schemas.openxmlformats.org/drawingml/2006/main" xmlns:r="http://schemas.openxmlformats.org/officeDocument/2006/relationships" xmlns:p="http://schemas.openxmlformats.org/presentationml/2006/main">
+  <p:cSld>
+    <p:bg>
+      <p:bgPr>
+        <a:solidFill>
+          <a:schemeClr val="bg2"/>
+        </a:solidFill>
+        <a:effectLst/>
+      </p:bgPr>
+    </p:bg>
+    <p:spTree>
+      <p:nvGrpSpPr>
+        <p:cNvPr id="1" name=""/>
+        <p:cNvGrpSpPr/>
+        <p:nvPr/>
+      </p:nvGrpSpPr>
+      <p:grpSpPr>
+        <a:xfrm>
+          <a:off x="0" y="0"/>
+          <a:ext cx="0" cy="0"/>
+          <a:chOff x="0" y="0"/>
+          <a:chExt cx="0" cy="0"/>
+        </a:xfrm>
+      </p:grpSpPr>
+      <p:sp useBgFill="1">
+        <p:nvSpPr>
+          <p:cNvPr id="10" name="Rectangle 9">
+            <a:extLst>
+              <a:ext uri="{FF2B5EF4-FFF2-40B4-BE49-F238E27FC236}">
+                <a16:creationId xmlns:a16="http://schemas.microsoft.com/office/drawing/2014/main" id="{53F29798-D584-4792-9B62-3F5F5C36D619}"/>
+              </a:ext>
+              <a:ext uri="{C183D7F6-B498-43B3-948B-1728B52AA6E4}">
+                <adec:decorative xmlns:adec="http://schemas.microsoft.com/office/drawing/2017/decorative" val="1"/>
+              </a:ext>
+            </a:extLst>
+          </p:cNvPr>
+          <p:cNvSpPr>
+            <a:spLocks noGrp="1" noRot="1" noChangeAspect="1" noMove="1" noResize="1" noEditPoints="1" noAdjustHandles="1" noChangeArrowheads="1" noChangeShapeType="1" noTextEdit="1"/>
+          </p:cNvSpPr>
+          <p:nvPr>
+            <p:extLst>
+              <p:ext uri="{386F3935-93C4-4BCD-93E2-E3B085C9AB24}">
+                <p16:designElem xmlns:p16="http://schemas.microsoft.com/office/powerpoint/2015/main" val="1"/>
+              </p:ext>
+            </p:extLst>
+          </p:nvPr>
+        </p:nvSpPr>
+        <p:spPr>
+          <a:xfrm>
+            <a:off x="0" y="0"/>
+            <a:ext cx="12188952" cy="6858000"/>
+          </a:xfrm>
+          <a:prstGeom prst="rect">
+            <a:avLst/>
+          </a:prstGeom>
+          <a:ln>
+            <a:noFill/>
+          </a:ln>
+        </p:spPr>
+        <p:style>
+          <a:lnRef idx="2">
+            <a:schemeClr val="accent1">
+              <a:shade val="50000"/>
+            </a:schemeClr>
+          </a:lnRef>
+          <a:fillRef idx="1">
+            <a:schemeClr val="accent1"/>
+          </a:fillRef>
+          <a:effectRef idx="0">
+            <a:schemeClr val="accent1"/>
+          </a:effectRef>
+          <a:fontRef idx="minor">
+            <a:schemeClr val="lt1"/>
+          </a:fontRef>
+        </p:style>
+        <p:txBody>
+          <a:bodyPr rtlCol="0" anchor="ctr"/>
+          <a:lstStyle/>
+          <a:p>
+            <a:pPr algn="ctr"/>
+            <a:endParaRPr lang="en-US"/>
+          </a:p>
+        </p:txBody>
+      </p:sp>
+      <p:sp>
+        <p:nvSpPr>
+          <p:cNvPr id="2" name="Title 1">
+            <a:extLst>
+              <a:ext uri="{FF2B5EF4-FFF2-40B4-BE49-F238E27FC236}">
+                <a16:creationId xmlns:a16="http://schemas.microsoft.com/office/drawing/2014/main" id="{C8163A18-D894-FF42-A3CF-D81F0CB8B8FF}"/>
+              </a:ext>
+            </a:extLst>
+          </p:cNvPr>
+          <p:cNvSpPr>
+            <a:spLocks noGrp="1"/>
+          </p:cNvSpPr>
+          <p:nvPr>
+            <p:ph type="title"/>
+          </p:nvPr>
+        </p:nvSpPr>
+        <p:spPr>
+          <a:xfrm>
+            <a:off x="0" y="1"/>
+            <a:ext cx="12192000" cy="1690688"/>
+          </a:xfrm>
+          <a:solidFill>
+            <a:schemeClr val="bg1"/>
+          </a:solidFill>
+        </p:spPr>
+        <p:txBody>
+          <a:bodyPr vert="horz" lIns="91440" tIns="45720" rIns="91440" bIns="45720" rtlCol="0" anchor="ctr">
+            <a:normAutofit/>
+          </a:bodyPr>
+          <a:lstStyle/>
+          <a:p>
+            <a:pPr algn="ctr"/>
+            <a:r>
+              <a:rPr lang="en-US" sz="5200"/>
+              <a:t>How groupby() works</a:t>
+            </a:r>
+          </a:p>
+        </p:txBody>
+      </p:sp>
+      <p:pic>
+        <p:nvPicPr>
+          <p:cNvPr id="9" name="Picture 8" descr="Graphical user interface&#10;&#10;Description automatically generated with low confidence">
+            <a:extLst>
+              <a:ext uri="{FF2B5EF4-FFF2-40B4-BE49-F238E27FC236}">
+                <a16:creationId xmlns:a16="http://schemas.microsoft.com/office/drawing/2014/main" id="{06B6FDF8-3F40-AA43-8EAC-15638AAD834D}"/>
+              </a:ext>
+            </a:extLst>
+          </p:cNvPr>
+          <p:cNvPicPr>
+            <a:picLocks noChangeAspect="1"/>
+          </p:cNvPicPr>
+          <p:nvPr/>
+        </p:nvPicPr>
+        <p:blipFill>
+          <a:blip r:embed="rId2"/>
+          <a:stretch>
+            <a:fillRect/>
+          </a:stretch>
+        </p:blipFill>
+        <p:spPr>
+          <a:xfrm>
+            <a:off x="946295" y="1916615"/>
+            <a:ext cx="10296361" cy="4715459"/>
+          </a:xfrm>
+          <a:prstGeom prst="rect">
+            <a:avLst/>
+          </a:prstGeom>
+        </p:spPr>
+      </p:pic>
+    </p:spTree>
+    <p:extLst>
+      <p:ext uri="{BB962C8B-B14F-4D97-AF65-F5344CB8AC3E}">
+        <p14:creationId xmlns:p14="http://schemas.microsoft.com/office/powerpoint/2010/main" val="1500885899"/>
       </p:ext>
     </p:extLst>
   </p:cSld>
@@ -5055,6 +6555,194 @@
           <a:effectLst/>
         </p:spPr>
       </p:pic>
+      <p:pic>
+        <p:nvPicPr>
+          <p:cNvPr id="2050" name="Picture 2" descr="Apache Airflow - Wikipedia">
+            <a:extLst>
+              <a:ext uri="{FF2B5EF4-FFF2-40B4-BE49-F238E27FC236}">
+                <a16:creationId xmlns:a16="http://schemas.microsoft.com/office/drawing/2014/main" id="{0125145F-4612-7744-AD0F-1A8154A3BBDE}"/>
+              </a:ext>
+            </a:extLst>
+          </p:cNvPr>
+          <p:cNvPicPr>
+            <a:picLocks noChangeAspect="1" noChangeArrowheads="1"/>
+          </p:cNvPicPr>
+          <p:nvPr/>
+        </p:nvPicPr>
+        <p:blipFill>
+          <a:blip r:embed="rId4">
+            <a:extLst>
+              <a:ext uri="{28A0092B-C50C-407E-A947-70E740481C1C}">
+                <a14:useLocalDpi xmlns:a14="http://schemas.microsoft.com/office/drawing/2010/main" val="0"/>
+              </a:ext>
+            </a:extLst>
+          </a:blip>
+          <a:srcRect/>
+          <a:stretch>
+            <a:fillRect/>
+          </a:stretch>
+        </p:blipFill>
+        <p:spPr bwMode="auto">
+          <a:xfrm>
+            <a:off x="10789902" y="3203878"/>
+            <a:ext cx="1172577" cy="450244"/>
+          </a:xfrm>
+          <a:prstGeom prst="rect">
+            <a:avLst/>
+          </a:prstGeom>
+          <a:noFill/>
+          <a:extLst>
+            <a:ext uri="{909E8E84-426E-40DD-AFC4-6F175D3DCCD1}">
+              <a14:hiddenFill xmlns:a14="http://schemas.microsoft.com/office/drawing/2010/main">
+                <a:solidFill>
+                  <a:srgbClr val="FFFFFF"/>
+                </a:solidFill>
+              </a14:hiddenFill>
+            </a:ext>
+          </a:extLst>
+        </p:spPr>
+      </p:pic>
+      <p:pic>
+        <p:nvPicPr>
+          <p:cNvPr id="2056" name="Picture 8">
+            <a:extLst>
+              <a:ext uri="{FF2B5EF4-FFF2-40B4-BE49-F238E27FC236}">
+                <a16:creationId xmlns:a16="http://schemas.microsoft.com/office/drawing/2014/main" id="{C798E593-BE81-D84E-9C9A-113BE0F1C23A}"/>
+              </a:ext>
+            </a:extLst>
+          </p:cNvPr>
+          <p:cNvPicPr>
+            <a:picLocks noChangeAspect="1" noChangeArrowheads="1"/>
+          </p:cNvPicPr>
+          <p:nvPr/>
+        </p:nvPicPr>
+        <p:blipFill>
+          <a:blip r:embed="rId5">
+            <a:extLst>
+              <a:ext uri="{28A0092B-C50C-407E-A947-70E740481C1C}">
+                <a14:useLocalDpi xmlns:a14="http://schemas.microsoft.com/office/drawing/2010/main" val="0"/>
+              </a:ext>
+            </a:extLst>
+          </a:blip>
+          <a:srcRect/>
+          <a:stretch>
+            <a:fillRect/>
+          </a:stretch>
+        </p:blipFill>
+        <p:spPr bwMode="auto">
+          <a:xfrm>
+            <a:off x="5402074" y="804672"/>
+            <a:ext cx="693926" cy="807356"/>
+          </a:xfrm>
+          <a:prstGeom prst="rect">
+            <a:avLst/>
+          </a:prstGeom>
+          <a:noFill/>
+          <a:extLst>
+            <a:ext uri="{909E8E84-426E-40DD-AFC4-6F175D3DCCD1}">
+              <a14:hiddenFill xmlns:a14="http://schemas.microsoft.com/office/drawing/2010/main">
+                <a:solidFill>
+                  <a:srgbClr val="FFFFFF"/>
+                </a:solidFill>
+              </a14:hiddenFill>
+            </a:ext>
+          </a:extLst>
+        </p:spPr>
+      </p:pic>
+      <p:pic>
+        <p:nvPicPr>
+          <p:cNvPr id="2058" name="Picture 10" descr="Unit Testing with PySpark. By David Illes, Vice President at… | by  Cambridge Spark | Cambridge Spark">
+            <a:extLst>
+              <a:ext uri="{FF2B5EF4-FFF2-40B4-BE49-F238E27FC236}">
+                <a16:creationId xmlns:a16="http://schemas.microsoft.com/office/drawing/2014/main" id="{ABB51496-6CBC-BC40-BA06-D75D4A194F2B}"/>
+              </a:ext>
+            </a:extLst>
+          </p:cNvPr>
+          <p:cNvPicPr>
+            <a:picLocks noChangeAspect="1" noChangeArrowheads="1"/>
+          </p:cNvPicPr>
+          <p:nvPr/>
+        </p:nvPicPr>
+        <p:blipFill>
+          <a:blip r:embed="rId6">
+            <a:extLst>
+              <a:ext uri="{28A0092B-C50C-407E-A947-70E740481C1C}">
+                <a14:useLocalDpi xmlns:a14="http://schemas.microsoft.com/office/drawing/2010/main" val="0"/>
+              </a:ext>
+            </a:extLst>
+          </a:blip>
+          <a:srcRect/>
+          <a:stretch>
+            <a:fillRect/>
+          </a:stretch>
+        </p:blipFill>
+        <p:spPr bwMode="auto">
+          <a:xfrm>
+            <a:off x="10087140" y="804672"/>
+            <a:ext cx="1289050" cy="724282"/>
+          </a:xfrm>
+          <a:prstGeom prst="rect">
+            <a:avLst/>
+          </a:prstGeom>
+          <a:noFill/>
+          <a:extLst>
+            <a:ext uri="{909E8E84-426E-40DD-AFC4-6F175D3DCCD1}">
+              <a14:hiddenFill xmlns:a14="http://schemas.microsoft.com/office/drawing/2010/main">
+                <a:solidFill>
+                  <a:srgbClr val="FFFFFF"/>
+                </a:solidFill>
+              </a14:hiddenFill>
+            </a:ext>
+          </a:extLst>
+        </p:spPr>
+      </p:pic>
+      <p:pic>
+        <p:nvPicPr>
+          <p:cNvPr id="11" name="Picture 10" descr="seaborn: statistical data visualization — seaborn 0.11.1 documentation">
+            <a:extLst>
+              <a:ext uri="{FF2B5EF4-FFF2-40B4-BE49-F238E27FC236}">
+                <a16:creationId xmlns:a16="http://schemas.microsoft.com/office/drawing/2014/main" id="{1FD05B8E-F514-6446-9020-81F21A8B7DFB}"/>
+              </a:ext>
+            </a:extLst>
+          </p:cNvPr>
+          <p:cNvPicPr>
+            <a:picLocks noChangeAspect="1" noChangeArrowheads="1"/>
+          </p:cNvPicPr>
+          <p:nvPr/>
+        </p:nvPicPr>
+        <p:blipFill>
+          <a:blip r:embed="rId7">
+            <a:extLst>
+              <a:ext uri="{28A0092B-C50C-407E-A947-70E740481C1C}">
+                <a14:useLocalDpi xmlns:a14="http://schemas.microsoft.com/office/drawing/2010/main" val="0"/>
+              </a:ext>
+            </a:extLst>
+          </a:blip>
+          <a:srcRect/>
+          <a:stretch>
+            <a:fillRect/>
+          </a:stretch>
+        </p:blipFill>
+        <p:spPr bwMode="auto">
+          <a:xfrm>
+            <a:off x="5749037" y="2644644"/>
+            <a:ext cx="885370" cy="252963"/>
+          </a:xfrm>
+          <a:prstGeom prst="rect">
+            <a:avLst/>
+          </a:prstGeom>
+          <a:noFill/>
+          <a:extLst>
+            <a:ext uri="{909E8E84-426E-40DD-AFC4-6F175D3DCCD1}">
+              <a14:hiddenFill xmlns:a14="http://schemas.microsoft.com/office/drawing/2010/main">
+                <a:solidFill>
+                  <a:srgbClr val="FFFFFF"/>
+                </a:solidFill>
+              </a14:hiddenFill>
+            </a:ext>
+          </a:extLst>
+        </p:spPr>
+      </p:pic>
     </p:spTree>
     <p:extLst>
       <p:ext uri="{BB962C8B-B14F-4D97-AF65-F5344CB8AC3E}">
@@ -5761,6 +7449,7 @@
           <a:bodyPr/>
           <a:lstStyle/>
           <a:p>
+            <a:pPr algn="ctr"/>
             <a:r>
               <a:rPr lang="en-NL"/>
               <a:t>Wat is pandas?</a:t>
@@ -5965,9 +7654,12 @@
         </p:nvSpPr>
         <p:spPr>
           <a:xfrm>
-            <a:off x="838200" y="365125"/>
-            <a:ext cx="10515600" cy="1325563"/>
-          </a:xfrm>
+            <a:off x="0" y="0"/>
+            <a:ext cx="12192000" cy="1690688"/>
+          </a:xfrm>
+          <a:solidFill>
+            <a:schemeClr val="bg1"/>
+          </a:solidFill>
         </p:spPr>
         <p:txBody>
           <a:bodyPr vert="horz" lIns="91440" tIns="45720" rIns="91440" bIns="45720" rtlCol="0" anchor="ctr">
@@ -5975,6 +7667,7 @@
           </a:bodyPr>
           <a:lstStyle/>
           <a:p>
+            <a:pPr algn="ctr"/>
             <a:r>
               <a:rPr lang="en-US"/>
               <a:t>Most important concept is a DataFrame</a:t>
@@ -6209,9 +7902,12 @@
         </p:nvSpPr>
         <p:spPr>
           <a:xfrm>
-            <a:off x="838200" y="365125"/>
-            <a:ext cx="10515600" cy="1325563"/>
-          </a:xfrm>
+            <a:off x="0" y="1"/>
+            <a:ext cx="12192000" cy="1690688"/>
+          </a:xfrm>
+          <a:solidFill>
+            <a:schemeClr val="bg1"/>
+          </a:solidFill>
         </p:spPr>
         <p:txBody>
           <a:bodyPr vert="horz" lIns="91440" tIns="45720" rIns="91440" bIns="45720" rtlCol="0" anchor="ctr">
@@ -6219,6 +7915,7 @@
           </a:bodyPr>
           <a:lstStyle/>
           <a:p>
+            <a:pPr algn="ctr"/>
             <a:r>
               <a:rPr lang="en-US"/>
               <a:t>Example of a Pandas Series</a:t>
@@ -6345,6 +8042,14 @@
 <file path=ppt/slides/slide9.xml><?xml version="1.0" encoding="utf-8"?>
 <p:sld xmlns:a="http://schemas.openxmlformats.org/drawingml/2006/main" xmlns:r="http://schemas.openxmlformats.org/officeDocument/2006/relationships" xmlns:p="http://schemas.openxmlformats.org/presentationml/2006/main">
   <p:cSld>
+    <p:bg>
+      <p:bgPr>
+        <a:solidFill>
+          <a:schemeClr val="bg2"/>
+        </a:solidFill>
+        <a:effectLst/>
+      </p:bgPr>
+    </p:bg>
     <p:spTree>
       <p:nvGrpSpPr>
         <p:cNvPr id="1" name=""/>
@@ -6359,6 +8064,66 @@
           <a:chExt cx="0" cy="0"/>
         </a:xfrm>
       </p:grpSpPr>
+      <p:sp useBgFill="1">
+        <p:nvSpPr>
+          <p:cNvPr id="10" name="Rectangle 9">
+            <a:extLst>
+              <a:ext uri="{FF2B5EF4-FFF2-40B4-BE49-F238E27FC236}">
+                <a16:creationId xmlns:a16="http://schemas.microsoft.com/office/drawing/2014/main" id="{53F29798-D584-4792-9B62-3F5F5C36D619}"/>
+              </a:ext>
+              <a:ext uri="{C183D7F6-B498-43B3-948B-1728B52AA6E4}">
+                <adec:decorative xmlns:adec="http://schemas.microsoft.com/office/drawing/2017/decorative" val="1"/>
+              </a:ext>
+            </a:extLst>
+          </p:cNvPr>
+          <p:cNvSpPr>
+            <a:spLocks noGrp="1" noRot="1" noChangeAspect="1" noMove="1" noResize="1" noEditPoints="1" noAdjustHandles="1" noChangeArrowheads="1" noChangeShapeType="1" noTextEdit="1"/>
+          </p:cNvSpPr>
+          <p:nvPr>
+            <p:extLst>
+              <p:ext uri="{386F3935-93C4-4BCD-93E2-E3B085C9AB24}">
+                <p16:designElem xmlns:p16="http://schemas.microsoft.com/office/powerpoint/2015/main" val="1"/>
+              </p:ext>
+            </p:extLst>
+          </p:nvPr>
+        </p:nvSpPr>
+        <p:spPr>
+          <a:xfrm>
+            <a:off x="0" y="0"/>
+            <a:ext cx="12188952" cy="6858000"/>
+          </a:xfrm>
+          <a:prstGeom prst="rect">
+            <a:avLst/>
+          </a:prstGeom>
+          <a:ln>
+            <a:noFill/>
+          </a:ln>
+        </p:spPr>
+        <p:style>
+          <a:lnRef idx="2">
+            <a:schemeClr val="accent1">
+              <a:shade val="50000"/>
+            </a:schemeClr>
+          </a:lnRef>
+          <a:fillRef idx="1">
+            <a:schemeClr val="accent1"/>
+          </a:fillRef>
+          <a:effectRef idx="0">
+            <a:schemeClr val="accent1"/>
+          </a:effectRef>
+          <a:fontRef idx="minor">
+            <a:schemeClr val="lt1"/>
+          </a:fontRef>
+        </p:style>
+        <p:txBody>
+          <a:bodyPr rtlCol="0" anchor="ctr"/>
+          <a:lstStyle/>
+          <a:p>
+            <a:pPr algn="ctr"/>
+            <a:endParaRPr lang="en-US"/>
+          </a:p>
+        </p:txBody>
+      </p:sp>
       <p:sp>
         <p:nvSpPr>
           <p:cNvPr id="2" name="Title 1">
@@ -6375,44 +8140,63 @@
             <p:ph type="title"/>
           </p:nvPr>
         </p:nvSpPr>
-        <p:spPr/>
-        <p:txBody>
-          <a:bodyPr/>
-          <a:lstStyle/>
-          <a:p>
-            <a:endParaRPr lang="en-NL"/>
-          </a:p>
-        </p:txBody>
-      </p:sp>
-      <p:sp>
-        <p:nvSpPr>
-          <p:cNvPr id="3" name="Content Placeholder 2">
-            <a:extLst>
-              <a:ext uri="{FF2B5EF4-FFF2-40B4-BE49-F238E27FC236}">
-                <a16:creationId xmlns:a16="http://schemas.microsoft.com/office/drawing/2014/main" id="{A862A42A-6411-234E-B760-651D87AF8D16}"/>
-              </a:ext>
-            </a:extLst>
-          </p:cNvPr>
-          <p:cNvSpPr>
-            <a:spLocks noGrp="1"/>
-          </p:cNvSpPr>
-          <p:nvPr>
-            <p:ph idx="1"/>
-          </p:nvPr>
-        </p:nvSpPr>
-        <p:spPr/>
-        <p:txBody>
-          <a:bodyPr/>
-          <a:lstStyle/>
-          <a:p>
-            <a:endParaRPr lang="en-NL"/>
-          </a:p>
-        </p:txBody>
-      </p:sp>
+        <p:spPr>
+          <a:xfrm>
+            <a:off x="0" y="1"/>
+            <a:ext cx="12192000" cy="1690688"/>
+          </a:xfrm>
+          <a:solidFill>
+            <a:schemeClr val="bg1"/>
+          </a:solidFill>
+        </p:spPr>
+        <p:txBody>
+          <a:bodyPr vert="horz" lIns="91440" tIns="45720" rIns="91440" bIns="45720" rtlCol="0" anchor="ctr">
+            <a:normAutofit/>
+          </a:bodyPr>
+          <a:lstStyle/>
+          <a:p>
+            <a:pPr algn="ctr"/>
+            <a:r>
+              <a:rPr lang="en-US" sz="5200"/>
+              <a:t>There are too many plotting packages</a:t>
+            </a:r>
+          </a:p>
+        </p:txBody>
+      </p:sp>
+      <p:pic>
+        <p:nvPicPr>
+          <p:cNvPr id="6" name="Picture 5" descr="Diagram&#10;&#10;Description automatically generated">
+            <a:extLst>
+              <a:ext uri="{FF2B5EF4-FFF2-40B4-BE49-F238E27FC236}">
+                <a16:creationId xmlns:a16="http://schemas.microsoft.com/office/drawing/2014/main" id="{CDEA112E-9883-2D4C-A588-CBB48AE23B30}"/>
+              </a:ext>
+            </a:extLst>
+          </p:cNvPr>
+          <p:cNvPicPr>
+            <a:picLocks noChangeAspect="1"/>
+          </p:cNvPicPr>
+          <p:nvPr/>
+        </p:nvPicPr>
+        <p:blipFill>
+          <a:blip r:embed="rId2"/>
+          <a:stretch>
+            <a:fillRect/>
+          </a:stretch>
+        </p:blipFill>
+        <p:spPr>
+          <a:xfrm>
+            <a:off x="1443555" y="1945715"/>
+            <a:ext cx="8977703" cy="4564736"/>
+          </a:xfrm>
+          <a:prstGeom prst="rect">
+            <a:avLst/>
+          </a:prstGeom>
+        </p:spPr>
+      </p:pic>
     </p:spTree>
     <p:extLst>
       <p:ext uri="{BB962C8B-B14F-4D97-AF65-F5344CB8AC3E}">
-        <p14:creationId xmlns:p14="http://schemas.microsoft.com/office/powerpoint/2010/main" val="1500885899"/>
+        <p14:creationId xmlns:p14="http://schemas.microsoft.com/office/powerpoint/2010/main" val="3851740515"/>
       </p:ext>
     </p:extLst>
   </p:cSld>

</xml_diff>

<commit_message>
slide on merging tables
</commit_message>
<xml_diff>
--- a/Pandas_Training_Slides.pptx
+++ b/Pandas_Training_Slides.pptx
@@ -5,7 +5,7 @@
     <p:sldMasterId id="2147483648" r:id="rId1"/>
   </p:sldMasterIdLst>
   <p:notesMasterIdLst>
-    <p:notesMasterId r:id="rId13"/>
+    <p:notesMasterId r:id="rId14"/>
   </p:notesMasterIdLst>
   <p:sldIdLst>
     <p:sldId id="263" r:id="rId2"/>
@@ -19,6 +19,7 @@
     <p:sldId id="266" r:id="rId10"/>
     <p:sldId id="267" r:id="rId11"/>
     <p:sldId id="265" r:id="rId12"/>
+    <p:sldId id="269" r:id="rId13"/>
   </p:sldIdLst>
   <p:sldSz cx="12192000" cy="6858000"/>
   <p:notesSz cx="6858000" cy="9144000"/>
@@ -206,7 +207,7 @@
           </a:lstStyle>
           <a:p>
             <a:fld id="{E57A08F2-BB89-A243-B58E-EF977EF4C386}" type="datetimeFigureOut">
-              <a:t>14/01/2021</a:t>
+              <a:t>25/01/2021</a:t>
             </a:fld>
             <a:endParaRPr lang="en-NL"/>
           </a:p>
@@ -1241,7 +1242,7 @@
           <a:lstStyle/>
           <a:p>
             <a:fld id="{595B5CFB-66E7-284C-9A5B-718B2335AB36}" type="datetimeFigureOut">
-              <a:t>14/01/2021</a:t>
+              <a:t>25/01/2021</a:t>
             </a:fld>
             <a:endParaRPr lang="en-NL"/>
           </a:p>
@@ -1439,7 +1440,7 @@
           <a:lstStyle/>
           <a:p>
             <a:fld id="{595B5CFB-66E7-284C-9A5B-718B2335AB36}" type="datetimeFigureOut">
-              <a:t>14/01/2021</a:t>
+              <a:t>25/01/2021</a:t>
             </a:fld>
             <a:endParaRPr lang="en-NL"/>
           </a:p>
@@ -1647,7 +1648,7 @@
           <a:lstStyle/>
           <a:p>
             <a:fld id="{595B5CFB-66E7-284C-9A5B-718B2335AB36}" type="datetimeFigureOut">
-              <a:t>14/01/2021</a:t>
+              <a:t>25/01/2021</a:t>
             </a:fld>
             <a:endParaRPr lang="en-NL"/>
           </a:p>
@@ -1845,7 +1846,7 @@
           <a:lstStyle/>
           <a:p>
             <a:fld id="{595B5CFB-66E7-284C-9A5B-718B2335AB36}" type="datetimeFigureOut">
-              <a:t>14/01/2021</a:t>
+              <a:t>25/01/2021</a:t>
             </a:fld>
             <a:endParaRPr lang="en-NL"/>
           </a:p>
@@ -2119,7 +2120,7 @@
           <a:lstStyle/>
           <a:p>
             <a:fld id="{595B5CFB-66E7-284C-9A5B-718B2335AB36}" type="datetimeFigureOut">
-              <a:t>14/01/2021</a:t>
+              <a:t>25/01/2021</a:t>
             </a:fld>
             <a:endParaRPr lang="en-NL"/>
           </a:p>
@@ -2385,7 +2386,7 @@
           <a:lstStyle/>
           <a:p>
             <a:fld id="{595B5CFB-66E7-284C-9A5B-718B2335AB36}" type="datetimeFigureOut">
-              <a:t>14/01/2021</a:t>
+              <a:t>25/01/2021</a:t>
             </a:fld>
             <a:endParaRPr lang="en-NL"/>
           </a:p>
@@ -2798,7 +2799,7 @@
           <a:lstStyle/>
           <a:p>
             <a:fld id="{595B5CFB-66E7-284C-9A5B-718B2335AB36}" type="datetimeFigureOut">
-              <a:t>14/01/2021</a:t>
+              <a:t>25/01/2021</a:t>
             </a:fld>
             <a:endParaRPr lang="en-NL"/>
           </a:p>
@@ -2938,7 +2939,7 @@
           <a:lstStyle/>
           <a:p>
             <a:fld id="{595B5CFB-66E7-284C-9A5B-718B2335AB36}" type="datetimeFigureOut">
-              <a:t>14/01/2021</a:t>
+              <a:t>25/01/2021</a:t>
             </a:fld>
             <a:endParaRPr lang="en-NL"/>
           </a:p>
@@ -3049,7 +3050,7 @@
           <a:lstStyle/>
           <a:p>
             <a:fld id="{595B5CFB-66E7-284C-9A5B-718B2335AB36}" type="datetimeFigureOut">
-              <a:t>14/01/2021</a:t>
+              <a:t>25/01/2021</a:t>
             </a:fld>
             <a:endParaRPr lang="en-NL"/>
           </a:p>
@@ -3360,7 +3361,7 @@
           <a:lstStyle/>
           <a:p>
             <a:fld id="{595B5CFB-66E7-284C-9A5B-718B2335AB36}" type="datetimeFigureOut">
-              <a:t>14/01/2021</a:t>
+              <a:t>25/01/2021</a:t>
             </a:fld>
             <a:endParaRPr lang="en-NL"/>
           </a:p>
@@ -3647,7 +3648,7 @@
           <a:lstStyle/>
           <a:p>
             <a:fld id="{595B5CFB-66E7-284C-9A5B-718B2335AB36}" type="datetimeFigureOut">
-              <a:t>14/01/2021</a:t>
+              <a:t>25/01/2021</a:t>
             </a:fld>
             <a:endParaRPr lang="en-NL"/>
           </a:p>
@@ -3888,7 +3889,7 @@
           </a:lstStyle>
           <a:p>
             <a:fld id="{595B5CFB-66E7-284C-9A5B-718B2335AB36}" type="datetimeFigureOut">
-              <a:t>14/01/2021</a:t>
+              <a:t>25/01/2021</a:t>
             </a:fld>
             <a:endParaRPr lang="en-NL"/>
           </a:p>
@@ -5962,6 +5963,401 @@
 </p:sld>
 </file>
 
+<file path=ppt/slides/slide12.xml><?xml version="1.0" encoding="utf-8"?>
+<p:sld xmlns:a="http://schemas.openxmlformats.org/drawingml/2006/main" xmlns:r="http://schemas.openxmlformats.org/officeDocument/2006/relationships" xmlns:p="http://schemas.openxmlformats.org/presentationml/2006/main">
+  <p:cSld>
+    <p:spTree>
+      <p:nvGrpSpPr>
+        <p:cNvPr id="1" name=""/>
+        <p:cNvGrpSpPr/>
+        <p:nvPr/>
+      </p:nvGrpSpPr>
+      <p:grpSpPr>
+        <a:xfrm>
+          <a:off x="0" y="0"/>
+          <a:ext cx="0" cy="0"/>
+          <a:chOff x="0" y="0"/>
+          <a:chExt cx="0" cy="0"/>
+        </a:xfrm>
+      </p:grpSpPr>
+      <p:sp>
+        <p:nvSpPr>
+          <p:cNvPr id="2" name="Title 1">
+            <a:extLst>
+              <a:ext uri="{FF2B5EF4-FFF2-40B4-BE49-F238E27FC236}">
+                <a16:creationId xmlns:a16="http://schemas.microsoft.com/office/drawing/2014/main" id="{9C875679-4635-8D4A-9122-A34E64C4B8FB}"/>
+              </a:ext>
+            </a:extLst>
+          </p:cNvPr>
+          <p:cNvSpPr>
+            <a:spLocks noGrp="1"/>
+          </p:cNvSpPr>
+          <p:nvPr>
+            <p:ph type="title"/>
+          </p:nvPr>
+        </p:nvSpPr>
+        <p:spPr>
+          <a:xfrm>
+            <a:off x="0" y="1"/>
+            <a:ext cx="12192000" cy="760946"/>
+          </a:xfrm>
+        </p:spPr>
+        <p:txBody>
+          <a:bodyPr/>
+          <a:lstStyle/>
+          <a:p>
+            <a:pPr algn="ctr"/>
+            <a:r>
+              <a:rPr lang="en-US"/>
+              <a:t>Joining tables with df.merge()</a:t>
+            </a:r>
+            <a:endParaRPr lang="en-NL"/>
+          </a:p>
+        </p:txBody>
+      </p:sp>
+      <p:pic>
+        <p:nvPicPr>
+          <p:cNvPr id="15" name="Picture 14" descr="Table&#10;&#10;Description automatically generated">
+            <a:extLst>
+              <a:ext uri="{FF2B5EF4-FFF2-40B4-BE49-F238E27FC236}">
+                <a16:creationId xmlns:a16="http://schemas.microsoft.com/office/drawing/2014/main" id="{51575A50-8DBA-9D48-B45E-816768855A18}"/>
+              </a:ext>
+            </a:extLst>
+          </p:cNvPr>
+          <p:cNvPicPr>
+            <a:picLocks noChangeAspect="1"/>
+          </p:cNvPicPr>
+          <p:nvPr/>
+        </p:nvPicPr>
+        <p:blipFill>
+          <a:blip r:embed="rId2"/>
+          <a:stretch>
+            <a:fillRect/>
+          </a:stretch>
+        </p:blipFill>
+        <p:spPr>
+          <a:xfrm>
+            <a:off x="6095999" y="775611"/>
+            <a:ext cx="2859316" cy="1524969"/>
+          </a:xfrm>
+          <a:prstGeom prst="rect">
+            <a:avLst/>
+          </a:prstGeom>
+        </p:spPr>
+      </p:pic>
+      <p:pic>
+        <p:nvPicPr>
+          <p:cNvPr id="17" name="Picture 16" descr="Diagram&#10;&#10;Description automatically generated">
+            <a:extLst>
+              <a:ext uri="{FF2B5EF4-FFF2-40B4-BE49-F238E27FC236}">
+                <a16:creationId xmlns:a16="http://schemas.microsoft.com/office/drawing/2014/main" id="{64B65442-3C39-B94E-B10E-BB788DAB0F9B}"/>
+              </a:ext>
+            </a:extLst>
+          </p:cNvPr>
+          <p:cNvPicPr>
+            <a:picLocks noChangeAspect="1"/>
+          </p:cNvPicPr>
+          <p:nvPr/>
+        </p:nvPicPr>
+        <p:blipFill>
+          <a:blip r:embed="rId3"/>
+          <a:stretch>
+            <a:fillRect/>
+          </a:stretch>
+        </p:blipFill>
+        <p:spPr>
+          <a:xfrm>
+            <a:off x="239485" y="2365559"/>
+            <a:ext cx="11713029" cy="2324375"/>
+          </a:xfrm>
+          <a:prstGeom prst="rect">
+            <a:avLst/>
+          </a:prstGeom>
+        </p:spPr>
+      </p:pic>
+      <p:pic>
+        <p:nvPicPr>
+          <p:cNvPr id="19" name="Picture 18" descr="Table&#10;&#10;Description automatically generated with medium confidence">
+            <a:extLst>
+              <a:ext uri="{FF2B5EF4-FFF2-40B4-BE49-F238E27FC236}">
+                <a16:creationId xmlns:a16="http://schemas.microsoft.com/office/drawing/2014/main" id="{92FDE4AF-DE66-4647-AC97-B831C957AA71}"/>
+              </a:ext>
+            </a:extLst>
+          </p:cNvPr>
+          <p:cNvPicPr>
+            <a:picLocks noChangeAspect="1"/>
+          </p:cNvPicPr>
+          <p:nvPr/>
+        </p:nvPicPr>
+        <p:blipFill>
+          <a:blip r:embed="rId4"/>
+          <a:stretch>
+            <a:fillRect/>
+          </a:stretch>
+        </p:blipFill>
+        <p:spPr>
+          <a:xfrm>
+            <a:off x="3724595" y="1004976"/>
+            <a:ext cx="1718128" cy="1171451"/>
+          </a:xfrm>
+          <a:prstGeom prst="rect">
+            <a:avLst/>
+          </a:prstGeom>
+        </p:spPr>
+      </p:pic>
+      <p:pic>
+        <p:nvPicPr>
+          <p:cNvPr id="21" name="Picture 20" descr="Table&#10;&#10;Description automatically generated">
+            <a:extLst>
+              <a:ext uri="{FF2B5EF4-FFF2-40B4-BE49-F238E27FC236}">
+                <a16:creationId xmlns:a16="http://schemas.microsoft.com/office/drawing/2014/main" id="{B944551A-D74F-284E-83DC-B4913095FB1D}"/>
+              </a:ext>
+            </a:extLst>
+          </p:cNvPr>
+          <p:cNvPicPr>
+            <a:picLocks noChangeAspect="1"/>
+          </p:cNvPicPr>
+          <p:nvPr/>
+        </p:nvPicPr>
+        <p:blipFill>
+          <a:blip r:embed="rId5"/>
+          <a:stretch>
+            <a:fillRect/>
+          </a:stretch>
+        </p:blipFill>
+        <p:spPr>
+          <a:xfrm>
+            <a:off x="6095999" y="4754914"/>
+            <a:ext cx="2631876" cy="1020728"/>
+          </a:xfrm>
+          <a:prstGeom prst="rect">
+            <a:avLst/>
+          </a:prstGeom>
+        </p:spPr>
+      </p:pic>
+      <p:pic>
+        <p:nvPicPr>
+          <p:cNvPr id="30" name="Picture 29" descr="Table&#10;&#10;Description automatically generated">
+            <a:extLst>
+              <a:ext uri="{FF2B5EF4-FFF2-40B4-BE49-F238E27FC236}">
+                <a16:creationId xmlns:a16="http://schemas.microsoft.com/office/drawing/2014/main" id="{86FACDFA-550A-D247-8C22-1BDFCB08D421}"/>
+              </a:ext>
+            </a:extLst>
+          </p:cNvPr>
+          <p:cNvPicPr>
+            <a:picLocks noChangeAspect="1"/>
+          </p:cNvPicPr>
+          <p:nvPr/>
+        </p:nvPicPr>
+        <p:blipFill>
+          <a:blip r:embed="rId6"/>
+          <a:stretch>
+            <a:fillRect/>
+          </a:stretch>
+        </p:blipFill>
+        <p:spPr>
+          <a:xfrm>
+            <a:off x="0" y="4755821"/>
+            <a:ext cx="2360740" cy="1114550"/>
+          </a:xfrm>
+          <a:prstGeom prst="rect">
+            <a:avLst/>
+          </a:prstGeom>
+        </p:spPr>
+      </p:pic>
+      <p:pic>
+        <p:nvPicPr>
+          <p:cNvPr id="32" name="Picture 31" descr="Table&#10;&#10;Description automatically generated">
+            <a:extLst>
+              <a:ext uri="{FF2B5EF4-FFF2-40B4-BE49-F238E27FC236}">
+                <a16:creationId xmlns:a16="http://schemas.microsoft.com/office/drawing/2014/main" id="{89CCCCD2-BEB3-5247-AF84-0F1A03AD5ED2}"/>
+              </a:ext>
+            </a:extLst>
+          </p:cNvPr>
+          <p:cNvPicPr>
+            <a:picLocks noChangeAspect="1"/>
+          </p:cNvPicPr>
+          <p:nvPr/>
+        </p:nvPicPr>
+        <p:blipFill>
+          <a:blip r:embed="rId7"/>
+          <a:stretch>
+            <a:fillRect/>
+          </a:stretch>
+        </p:blipFill>
+        <p:spPr>
+          <a:xfrm>
+            <a:off x="2871360" y="4754914"/>
+            <a:ext cx="2571363" cy="1114550"/>
+          </a:xfrm>
+          <a:prstGeom prst="rect">
+            <a:avLst/>
+          </a:prstGeom>
+        </p:spPr>
+      </p:pic>
+      <p:pic>
+        <p:nvPicPr>
+          <p:cNvPr id="34" name="Picture 33">
+            <a:extLst>
+              <a:ext uri="{FF2B5EF4-FFF2-40B4-BE49-F238E27FC236}">
+                <a16:creationId xmlns:a16="http://schemas.microsoft.com/office/drawing/2014/main" id="{2EF50AA4-FC45-0043-BB69-17FA310964C5}"/>
+              </a:ext>
+            </a:extLst>
+          </p:cNvPr>
+          <p:cNvPicPr>
+            <a:picLocks noChangeAspect="1"/>
+          </p:cNvPicPr>
+          <p:nvPr/>
+        </p:nvPicPr>
+        <p:blipFill>
+          <a:blip r:embed="rId8"/>
+          <a:stretch>
+            <a:fillRect/>
+          </a:stretch>
+        </p:blipFill>
+        <p:spPr>
+          <a:xfrm>
+            <a:off x="9157321" y="4689934"/>
+            <a:ext cx="2795193" cy="1487611"/>
+          </a:xfrm>
+          <a:prstGeom prst="rect">
+            <a:avLst/>
+          </a:prstGeom>
+        </p:spPr>
+      </p:pic>
+      <p:pic>
+        <p:nvPicPr>
+          <p:cNvPr id="38" name="Picture 37">
+            <a:extLst>
+              <a:ext uri="{FF2B5EF4-FFF2-40B4-BE49-F238E27FC236}">
+                <a16:creationId xmlns:a16="http://schemas.microsoft.com/office/drawing/2014/main" id="{EDA5F37D-6241-5140-82DD-CE6DCB978C13}"/>
+              </a:ext>
+            </a:extLst>
+          </p:cNvPr>
+          <p:cNvPicPr>
+            <a:picLocks noChangeAspect="1"/>
+          </p:cNvPicPr>
+          <p:nvPr/>
+        </p:nvPicPr>
+        <p:blipFill>
+          <a:blip r:embed="rId9"/>
+          <a:stretch>
+            <a:fillRect/>
+          </a:stretch>
+        </p:blipFill>
+        <p:spPr>
+          <a:xfrm>
+            <a:off x="9157321" y="6439807"/>
+            <a:ext cx="2897700" cy="113487"/>
+          </a:xfrm>
+          <a:prstGeom prst="rect">
+            <a:avLst/>
+          </a:prstGeom>
+        </p:spPr>
+      </p:pic>
+      <p:pic>
+        <p:nvPicPr>
+          <p:cNvPr id="40" name="Picture 39">
+            <a:extLst>
+              <a:ext uri="{FF2B5EF4-FFF2-40B4-BE49-F238E27FC236}">
+                <a16:creationId xmlns:a16="http://schemas.microsoft.com/office/drawing/2014/main" id="{B45236B5-891A-4441-A5EB-A0A2C42EA80D}"/>
+              </a:ext>
+            </a:extLst>
+          </p:cNvPr>
+          <p:cNvPicPr>
+            <a:picLocks noChangeAspect="1"/>
+          </p:cNvPicPr>
+          <p:nvPr/>
+        </p:nvPicPr>
+        <p:blipFill>
+          <a:blip r:embed="rId10"/>
+          <a:stretch>
+            <a:fillRect/>
+          </a:stretch>
+        </p:blipFill>
+        <p:spPr>
+          <a:xfrm>
+            <a:off x="2871360" y="6452324"/>
+            <a:ext cx="2571363" cy="100970"/>
+          </a:xfrm>
+          <a:prstGeom prst="rect">
+            <a:avLst/>
+          </a:prstGeom>
+        </p:spPr>
+      </p:pic>
+      <p:pic>
+        <p:nvPicPr>
+          <p:cNvPr id="42" name="Picture 41">
+            <a:extLst>
+              <a:ext uri="{FF2B5EF4-FFF2-40B4-BE49-F238E27FC236}">
+                <a16:creationId xmlns:a16="http://schemas.microsoft.com/office/drawing/2014/main" id="{7A2A76C6-5018-FB46-B031-AB9B451E94AF}"/>
+              </a:ext>
+            </a:extLst>
+          </p:cNvPr>
+          <p:cNvPicPr>
+            <a:picLocks noChangeAspect="1"/>
+          </p:cNvPicPr>
+          <p:nvPr/>
+        </p:nvPicPr>
+        <p:blipFill>
+          <a:blip r:embed="rId11"/>
+          <a:stretch>
+            <a:fillRect/>
+          </a:stretch>
+        </p:blipFill>
+        <p:spPr>
+          <a:xfrm>
+            <a:off x="0" y="6452837"/>
+            <a:ext cx="2360740" cy="100457"/>
+          </a:xfrm>
+          <a:prstGeom prst="rect">
+            <a:avLst/>
+          </a:prstGeom>
+        </p:spPr>
+      </p:pic>
+      <p:pic>
+        <p:nvPicPr>
+          <p:cNvPr id="44" name="Picture 43">
+            <a:extLst>
+              <a:ext uri="{FF2B5EF4-FFF2-40B4-BE49-F238E27FC236}">
+                <a16:creationId xmlns:a16="http://schemas.microsoft.com/office/drawing/2014/main" id="{C000BAA9-1193-454D-A8DB-33E79C8D8F0D}"/>
+              </a:ext>
+            </a:extLst>
+          </p:cNvPr>
+          <p:cNvPicPr>
+            <a:picLocks noChangeAspect="1"/>
+          </p:cNvPicPr>
+          <p:nvPr/>
+        </p:nvPicPr>
+        <p:blipFill>
+          <a:blip r:embed="rId12"/>
+          <a:stretch>
+            <a:fillRect/>
+          </a:stretch>
+        </p:blipFill>
+        <p:spPr>
+          <a:xfrm>
+            <a:off x="6095999" y="6439807"/>
+            <a:ext cx="2631876" cy="115912"/>
+          </a:xfrm>
+          <a:prstGeom prst="rect">
+            <a:avLst/>
+          </a:prstGeom>
+        </p:spPr>
+      </p:pic>
+    </p:spTree>
+    <p:extLst>
+      <p:ext uri="{BB962C8B-B14F-4D97-AF65-F5344CB8AC3E}">
+        <p14:creationId xmlns:p14="http://schemas.microsoft.com/office/powerpoint/2010/main" val="3166028957"/>
+      </p:ext>
+    </p:extLst>
+  </p:cSld>
+  <p:clrMapOvr>
+    <a:masterClrMapping/>
+  </p:clrMapOvr>
+</p:sld>
+</file>
+
 <file path=ppt/slides/slide2.xml><?xml version="1.0" encoding="utf-8"?>
 <p:sld xmlns:a="http://schemas.openxmlformats.org/drawingml/2006/main" xmlns:r="http://schemas.openxmlformats.org/officeDocument/2006/relationships" xmlns:p="http://schemas.openxmlformats.org/presentationml/2006/main">
   <p:cSld>
@@ -7294,7 +7690,7 @@
         <p:spPr>
           <a:xfrm>
             <a:off x="769257" y="2714171"/>
-            <a:ext cx="10580914" cy="3416320"/>
+            <a:ext cx="10580914" cy="3139321"/>
           </a:xfrm>
           <a:prstGeom prst="rect">
             <a:avLst/>
@@ -7312,7 +7708,7 @@
               <a:buChar char="•"/>
             </a:pPr>
             <a:r>
-              <a:rPr lang="en-NL" sz="2400"/>
+              <a:rPr lang="en-NL"/>
               <a:t>Shift + Enter to run code</a:t>
             </a:r>
           </a:p>
@@ -7321,7 +7717,7 @@
               <a:buFont typeface="Arial" panose="020B0604020202020204" pitchFamily="34" charset="0"/>
               <a:buChar char="•"/>
             </a:pPr>
-            <a:endParaRPr lang="en-NL" sz="2400"/>
+            <a:endParaRPr lang="en-NL"/>
           </a:p>
           <a:p>
             <a:pPr marL="285750" indent="-285750">
@@ -7329,12 +7725,25 @@
               <a:buChar char="•"/>
             </a:pPr>
             <a:r>
-              <a:rPr lang="en-NL" sz="2400"/>
+              <a:rPr lang="en-NL"/>
               <a:t>Tab completion</a:t>
             </a:r>
           </a:p>
           <a:p>
-            <a:endParaRPr lang="en-NL" sz="2400"/>
+            <a:endParaRPr lang="en-NL"/>
+          </a:p>
+          <a:p>
+            <a:pPr marL="342900" indent="-342900">
+              <a:buFont typeface="Arial" panose="020B0604020202020204" pitchFamily="34" charset="0"/>
+              <a:buChar char="•"/>
+            </a:pPr>
+            <a:r>
+              <a:rPr lang="en-NL"/>
+              <a:t>Nieuwe cell: Escape gevolgd door a (above) of b (below) of dd (delete)</a:t>
+            </a:r>
+          </a:p>
+          <a:p>
+            <a:endParaRPr lang="en-NL"/>
           </a:p>
           <a:p>
             <a:pPr marL="285750" indent="-285750">
@@ -7342,41 +7751,37 @@
               <a:buChar char="•"/>
             </a:pPr>
             <a:r>
-              <a:rPr lang="en-NL" sz="2400"/>
+              <a:rPr lang="en-NL"/>
               <a:t>Shift Tab to see arguments and information about methods, functions or classes</a:t>
             </a:r>
+          </a:p>
+          <a:p>
+            <a:endParaRPr lang="en-NL"/>
           </a:p>
           <a:p>
             <a:pPr marL="285750" indent="-285750">
               <a:buFont typeface="Arial" panose="020B0604020202020204" pitchFamily="34" charset="0"/>
               <a:buChar char="•"/>
             </a:pPr>
-            <a:endParaRPr lang="en-NL" sz="2400"/>
+            <a:r>
+              <a:rPr lang="en-NL"/>
+              <a:t>Magic commands, such as ls</a:t>
+            </a:r>
           </a:p>
           <a:p>
             <a:pPr marL="285750" indent="-285750">
               <a:buFont typeface="Arial" panose="020B0604020202020204" pitchFamily="34" charset="0"/>
               <a:buChar char="•"/>
             </a:pPr>
-            <a:r>
-              <a:rPr lang="en-NL" sz="2400"/>
-              <a:t>Magic commands, such as ls</a:t>
-            </a:r>
+            <a:endParaRPr lang="en-NL"/>
           </a:p>
           <a:p>
             <a:pPr marL="285750" indent="-285750">
               <a:buFont typeface="Arial" panose="020B0604020202020204" pitchFamily="34" charset="0"/>
               <a:buChar char="•"/>
             </a:pPr>
-            <a:endParaRPr lang="en-NL" sz="2400"/>
-          </a:p>
-          <a:p>
-            <a:pPr marL="285750" indent="-285750">
-              <a:buFont typeface="Arial" panose="020B0604020202020204" pitchFamily="34" charset="0"/>
-              <a:buChar char="•"/>
-            </a:pPr>
-            <a:r>
-              <a:rPr lang="en-NL" sz="2400"/>
+            <a:r>
+              <a:rPr lang="en-NL"/>
               <a:t>? or ?? to get extra help and info</a:t>
             </a:r>
           </a:p>

</xml_diff>

<commit_message>
fixed small typo pd.merge
</commit_message>
<xml_diff>
--- a/Pandas_Training_Slides.pptx
+++ b/Pandas_Training_Slides.pptx
@@ -219,7 +219,7 @@
           </a:lstStyle>
           <a:p>
             <a:fld id="{E57A08F2-BB89-A243-B58E-EF977EF4C386}" type="datetimeFigureOut">
-              <a:t>27/01/2021</a:t>
+              <a:t>28/01/2021</a:t>
             </a:fld>
             <a:endParaRPr lang="en-NL"/>
           </a:p>
@@ -1863,7 +1863,7 @@
           <a:lstStyle/>
           <a:p>
             <a:fld id="{595B5CFB-66E7-284C-9A5B-718B2335AB36}" type="datetimeFigureOut">
-              <a:t>27/01/2021</a:t>
+              <a:t>28/01/2021</a:t>
             </a:fld>
             <a:endParaRPr lang="en-NL"/>
           </a:p>
@@ -2061,7 +2061,7 @@
           <a:lstStyle/>
           <a:p>
             <a:fld id="{595B5CFB-66E7-284C-9A5B-718B2335AB36}" type="datetimeFigureOut">
-              <a:t>27/01/2021</a:t>
+              <a:t>28/01/2021</a:t>
             </a:fld>
             <a:endParaRPr lang="en-NL"/>
           </a:p>
@@ -2269,7 +2269,7 @@
           <a:lstStyle/>
           <a:p>
             <a:fld id="{595B5CFB-66E7-284C-9A5B-718B2335AB36}" type="datetimeFigureOut">
-              <a:t>27/01/2021</a:t>
+              <a:t>28/01/2021</a:t>
             </a:fld>
             <a:endParaRPr lang="en-NL"/>
           </a:p>
@@ -2467,7 +2467,7 @@
           <a:lstStyle/>
           <a:p>
             <a:fld id="{595B5CFB-66E7-284C-9A5B-718B2335AB36}" type="datetimeFigureOut">
-              <a:t>27/01/2021</a:t>
+              <a:t>28/01/2021</a:t>
             </a:fld>
             <a:endParaRPr lang="en-NL"/>
           </a:p>
@@ -2741,7 +2741,7 @@
           <a:lstStyle/>
           <a:p>
             <a:fld id="{595B5CFB-66E7-284C-9A5B-718B2335AB36}" type="datetimeFigureOut">
-              <a:t>27/01/2021</a:t>
+              <a:t>28/01/2021</a:t>
             </a:fld>
             <a:endParaRPr lang="en-NL"/>
           </a:p>
@@ -3007,7 +3007,7 @@
           <a:lstStyle/>
           <a:p>
             <a:fld id="{595B5CFB-66E7-284C-9A5B-718B2335AB36}" type="datetimeFigureOut">
-              <a:t>27/01/2021</a:t>
+              <a:t>28/01/2021</a:t>
             </a:fld>
             <a:endParaRPr lang="en-NL"/>
           </a:p>
@@ -3420,7 +3420,7 @@
           <a:lstStyle/>
           <a:p>
             <a:fld id="{595B5CFB-66E7-284C-9A5B-718B2335AB36}" type="datetimeFigureOut">
-              <a:t>27/01/2021</a:t>
+              <a:t>28/01/2021</a:t>
             </a:fld>
             <a:endParaRPr lang="en-NL"/>
           </a:p>
@@ -3560,7 +3560,7 @@
           <a:lstStyle/>
           <a:p>
             <a:fld id="{595B5CFB-66E7-284C-9A5B-718B2335AB36}" type="datetimeFigureOut">
-              <a:t>27/01/2021</a:t>
+              <a:t>28/01/2021</a:t>
             </a:fld>
             <a:endParaRPr lang="en-NL"/>
           </a:p>
@@ -3671,7 +3671,7 @@
           <a:lstStyle/>
           <a:p>
             <a:fld id="{595B5CFB-66E7-284C-9A5B-718B2335AB36}" type="datetimeFigureOut">
-              <a:t>27/01/2021</a:t>
+              <a:t>28/01/2021</a:t>
             </a:fld>
             <a:endParaRPr lang="en-NL"/>
           </a:p>
@@ -3982,7 +3982,7 @@
           <a:lstStyle/>
           <a:p>
             <a:fld id="{595B5CFB-66E7-284C-9A5B-718B2335AB36}" type="datetimeFigureOut">
-              <a:t>27/01/2021</a:t>
+              <a:t>28/01/2021</a:t>
             </a:fld>
             <a:endParaRPr lang="en-NL"/>
           </a:p>
@@ -4269,7 +4269,7 @@
           <a:lstStyle/>
           <a:p>
             <a:fld id="{595B5CFB-66E7-284C-9A5B-718B2335AB36}" type="datetimeFigureOut">
-              <a:t>27/01/2021</a:t>
+              <a:t>28/01/2021</a:t>
             </a:fld>
             <a:endParaRPr lang="en-NL"/>
           </a:p>
@@ -4510,7 +4510,7 @@
           </a:lstStyle>
           <a:p>
             <a:fld id="{595B5CFB-66E7-284C-9A5B-718B2335AB36}" type="datetimeFigureOut">
-              <a:t>27/01/2021</a:t>
+              <a:t>28/01/2021</a:t>
             </a:fld>
             <a:endParaRPr lang="en-NL"/>
           </a:p>
@@ -5435,7 +5435,7 @@
           <a:p>
             <a:r>
               <a:rPr lang="en-NL" sz="3600"/>
-              <a:t>Jupyter Notebooks               vs          Visual Studio Code   </a:t>
+              <a:t>Jupyter Notebooks               or          Visual Studio Code   </a:t>
             </a:r>
           </a:p>
         </p:txBody>
@@ -9200,7 +9200,7 @@
           <a:p>
             <a:r>
               <a:rPr lang="en-NL"/>
-              <a:t>Using df.merg() to join tables:</a:t>
+              <a:t>Using df.merge() to join tables:</a:t>
             </a:r>
           </a:p>
           <a:p>

</xml_diff>